<commit_message>
docs: fix font ppt
</commit_message>
<xml_diff>
--- a/docs/gameIndiePPT.pptx
+++ b/docs/gameIndiePPT.pptx
@@ -44,15 +44,8 @@
       <p:regular r:id="rId30"/>
     </p:embeddedFont>
     <p:embeddedFont>
-      <p:font typeface="Fira Sans" panose="020B0503050000020004" pitchFamily="34" charset="0"/>
+      <p:font typeface="Slabo 27px" panose="020B0604020202020204" charset="0"/>
       <p:regular r:id="rId31"/>
-      <p:bold r:id="rId32"/>
-      <p:italic r:id="rId33"/>
-      <p:boldItalic r:id="rId34"/>
-    </p:embeddedFont>
-    <p:embeddedFont>
-      <p:font typeface="Slabo 27px" panose="020B0604020202020204" charset="0"/>
-      <p:regular r:id="rId35"/>
     </p:embeddedFont>
   </p:embeddedFontLst>
   <p:defaultTextStyle>
@@ -14994,11 +14987,11 @@
   <p:clrMapOvr>
     <a:masterClrMapping/>
   </p:clrMapOvr>
-  <mc:AlternateContent xmlns:mc="http://schemas.openxmlformats.org/markup-compatibility/2006">
-    <mc:Choice xmlns:p14="http://schemas.microsoft.com/office/powerpoint/2010/main" Requires="p14">
+  <mc:AlternateContent xmlns:mc="http://schemas.openxmlformats.org/markup-compatibility/2006" xmlns:p14="http://schemas.microsoft.com/office/powerpoint/2010/main">
+    <mc:Choice Requires="p14">
       <p:transition p14:dur="10"/>
     </mc:Choice>
-    <mc:Fallback>
+    <mc:Fallback xmlns="">
       <p:transition/>
     </mc:Fallback>
   </mc:AlternateContent>
@@ -15873,7 +15866,7 @@
         <p:spPr>
           <a:xfrm>
             <a:off x="1838008" y="6755088"/>
-            <a:ext cx="5279072" cy="707886"/>
+            <a:ext cx="5279072" cy="646331"/>
           </a:xfrm>
           <a:prstGeom prst="rect">
             <a:avLst/>
@@ -15892,11 +15885,11 @@
               </a:buClr>
             </a:pPr>
             <a:r>
-              <a:rPr lang="en-US" sz="4000" dirty="0">
+              <a:rPr lang="en-US" sz="3600" dirty="0">
                 <a:solidFill>
                   <a:schemeClr val="bg1"/>
                 </a:solidFill>
-                <a:latin typeface="Slabo 27px" panose="020B0604020202020204" charset="0"/>
+                <a:latin typeface="+mj-lt"/>
               </a:rPr>
               <a:t>Các yêu cầu chức năng</a:t>
             </a:r>
@@ -15918,7 +15911,7 @@
         <p:spPr>
           <a:xfrm>
             <a:off x="10276481" y="9182143"/>
-            <a:ext cx="6547596" cy="584775"/>
+            <a:ext cx="6547596" cy="523220"/>
           </a:xfrm>
           <a:prstGeom prst="rect">
             <a:avLst/>
@@ -15937,11 +15930,11 @@
               </a:buClr>
             </a:pPr>
             <a:r>
-              <a:rPr lang="en-US" sz="3200" dirty="0">
+              <a:rPr lang="en-US" sz="2800" dirty="0">
                 <a:solidFill>
                   <a:schemeClr val="bg1"/>
                 </a:solidFill>
-                <a:latin typeface="Slabo 27px" panose="020B0604020202020204" charset="0"/>
+                <a:latin typeface="+mj-lt"/>
               </a:rPr>
               <a:t>Sơ đồ use case của người dùng</a:t>
             </a:r>
@@ -16742,7 +16735,7 @@
         <p:spPr>
           <a:xfrm>
             <a:off x="1838008" y="6755088"/>
-            <a:ext cx="5279072" cy="707886"/>
+            <a:ext cx="5279072" cy="646331"/>
           </a:xfrm>
           <a:prstGeom prst="rect">
             <a:avLst/>
@@ -16761,11 +16754,11 @@
               </a:buClr>
             </a:pPr>
             <a:r>
-              <a:rPr lang="en-US" sz="4000" dirty="0">
+              <a:rPr lang="en-US" sz="3600" dirty="0">
                 <a:solidFill>
                   <a:schemeClr val="bg1"/>
                 </a:solidFill>
-                <a:latin typeface="Slabo 27px" panose="020B0604020202020204" charset="0"/>
+                <a:latin typeface="+mj-lt"/>
               </a:rPr>
               <a:t>Các yêu cầu chức năng</a:t>
             </a:r>
@@ -16787,7 +16780,7 @@
         <p:spPr>
           <a:xfrm>
             <a:off x="10276480" y="8756074"/>
-            <a:ext cx="6547596" cy="584775"/>
+            <a:ext cx="6547596" cy="523220"/>
           </a:xfrm>
           <a:prstGeom prst="rect">
             <a:avLst/>
@@ -16806,11 +16799,11 @@
               </a:buClr>
             </a:pPr>
             <a:r>
-              <a:rPr lang="en-US" sz="3200" dirty="0">
+              <a:rPr lang="en-US" sz="2800" dirty="0">
                 <a:solidFill>
                   <a:schemeClr val="bg1"/>
                 </a:solidFill>
-                <a:latin typeface="Slabo 27px" panose="020B0604020202020204" charset="0"/>
+                <a:latin typeface="+mj-lt"/>
               </a:rPr>
               <a:t>Sơ đồ use case của quản trị viên</a:t>
             </a:r>
@@ -17610,7 +17603,7 @@
         <p:spPr>
           <a:xfrm>
             <a:off x="1838007" y="3340753"/>
-            <a:ext cx="5915326" cy="707886"/>
+            <a:ext cx="5915326" cy="646331"/>
           </a:xfrm>
           <a:prstGeom prst="rect">
             <a:avLst/>
@@ -17629,11 +17622,11 @@
               </a:buClr>
             </a:pPr>
             <a:r>
-              <a:rPr lang="en-US" sz="4000" dirty="0">
+              <a:rPr lang="en-US" sz="3600" dirty="0">
                 <a:solidFill>
                   <a:schemeClr val="bg1"/>
                 </a:solidFill>
-                <a:latin typeface="Slabo 27px" panose="020B0604020202020204" charset="0"/>
+                <a:latin typeface="+mj-lt"/>
               </a:rPr>
               <a:t>Các yêu cầu phi chức năng</a:t>
             </a:r>
@@ -17655,7 +17648,7 @@
         <p:spPr>
           <a:xfrm>
             <a:off x="1818940" y="4260201"/>
-            <a:ext cx="10525460" cy="3046988"/>
+            <a:ext cx="10525460" cy="2677656"/>
           </a:xfrm>
           <a:prstGeom prst="rect">
             <a:avLst/>
@@ -17676,11 +17669,11 @@
               <a:buChar char="v"/>
             </a:pPr>
             <a:r>
-              <a:rPr lang="en-US" sz="3200" dirty="0">
+              <a:rPr lang="en-US" sz="2800" dirty="0">
                 <a:solidFill>
                   <a:schemeClr val="bg1"/>
                 </a:solidFill>
-                <a:latin typeface="Slabo 27px" panose="020B0604020202020204" charset="0"/>
+                <a:latin typeface="+mj-lt"/>
               </a:rPr>
               <a:t>Yêu cầu thực thi: độ ổn định, sẵn sàng và chính xác.</a:t>
             </a:r>
@@ -17694,11 +17687,11 @@
               <a:buChar char="v"/>
             </a:pPr>
             <a:r>
-              <a:rPr lang="en-US" sz="3200" dirty="0">
+              <a:rPr lang="en-US" sz="2800" dirty="0">
                 <a:solidFill>
                   <a:schemeClr val="bg1"/>
                 </a:solidFill>
-                <a:latin typeface="Slabo 27px" panose="020B0604020202020204" charset="0"/>
+                <a:latin typeface="+mj-lt"/>
               </a:rPr>
               <a:t>Yêu cầu về an toàn: lưu trữ an toàn, có phương án sao lưu dữ liệu.</a:t>
             </a:r>
@@ -17712,11 +17705,11 @@
               <a:buChar char="v"/>
             </a:pPr>
             <a:r>
-              <a:rPr lang="en-US" sz="3200" dirty="0">
+              <a:rPr lang="en-US" sz="2800" dirty="0">
                 <a:solidFill>
                   <a:schemeClr val="bg1"/>
                 </a:solidFill>
-                <a:latin typeface="Slabo 27px" panose="020B0604020202020204" charset="0"/>
+                <a:latin typeface="+mj-lt"/>
               </a:rPr>
               <a:t>Yêu cầu về bảo mật: mã hoá thông tin tài khoản, phân quyền các chức năng.</a:t>
             </a:r>
@@ -17730,11 +17723,11 @@
               <a:buChar char="v"/>
             </a:pPr>
             <a:r>
-              <a:rPr lang="en-US" sz="3200" dirty="0">
+              <a:rPr lang="en-US" sz="2800" dirty="0">
                 <a:solidFill>
                   <a:schemeClr val="bg1"/>
                 </a:solidFill>
-                <a:latin typeface="Slabo 27px" panose="020B0604020202020204" charset="0"/>
+                <a:latin typeface="+mj-lt"/>
               </a:rPr>
               <a:t>Yêu cầu về giao diện: đầy đủ thông tin, đẹp mắt.</a:t>
             </a:r>
@@ -18505,7 +18498,7 @@
         <p:spPr>
           <a:xfrm>
             <a:off x="1706053" y="5604730"/>
-            <a:ext cx="5915326" cy="707886"/>
+            <a:ext cx="5915326" cy="646331"/>
           </a:xfrm>
           <a:prstGeom prst="rect">
             <a:avLst/>
@@ -18524,11 +18517,11 @@
               </a:buClr>
             </a:pPr>
             <a:r>
-              <a:rPr lang="en-US" sz="4000" dirty="0">
+              <a:rPr lang="en-US" sz="3600" dirty="0">
                 <a:solidFill>
                   <a:schemeClr val="bg1"/>
                 </a:solidFill>
-                <a:latin typeface="Slabo 27px" panose="020B0604020202020204" charset="0"/>
+                <a:latin typeface="+mj-lt"/>
               </a:rPr>
               <a:t>Thiết kế kiến trúc</a:t>
             </a:r>
@@ -18580,7 +18573,7 @@
         <p:spPr>
           <a:xfrm>
             <a:off x="9387013" y="9031944"/>
-            <a:ext cx="5915326" cy="523220"/>
+            <a:ext cx="5915326" cy="461665"/>
           </a:xfrm>
           <a:prstGeom prst="rect">
             <a:avLst/>
@@ -18599,11 +18592,11 @@
               </a:buClr>
             </a:pPr>
             <a:r>
-              <a:rPr lang="en-US" sz="2800" dirty="0">
+              <a:rPr lang="en-US" sz="2400" dirty="0">
                 <a:solidFill>
                   <a:schemeClr val="bg1"/>
                 </a:solidFill>
-                <a:latin typeface="Slabo 27px" panose="020B0604020202020204" charset="0"/>
+                <a:latin typeface="+mj-lt"/>
               </a:rPr>
               <a:t>Mô hình kiến trúc MVC của dự án</a:t>
             </a:r>
@@ -19238,7 +19231,7 @@
         <p:spPr>
           <a:xfrm>
             <a:off x="1730794" y="3138469"/>
-            <a:ext cx="5915326" cy="707886"/>
+            <a:ext cx="5915326" cy="646331"/>
           </a:xfrm>
           <a:prstGeom prst="rect">
             <a:avLst/>
@@ -19257,13 +19250,31 @@
               </a:buClr>
             </a:pPr>
             <a:r>
-              <a:rPr lang="en-US" sz="4000" dirty="0">
+              <a:rPr lang="en-US" sz="3600" dirty="0">
                 <a:solidFill>
                   <a:schemeClr val="bg1"/>
                 </a:solidFill>
-                <a:latin typeface="Slabo 27px" panose="020B0604020202020204" charset="0"/>
+                <a:latin typeface="+mj-lt"/>
               </a:rPr>
-              <a:t>Mô tả sự phân rã</a:t>
+              <a:t>Mô tả sự </a:t>
+            </a:r>
+            <a:r>
+              <a:rPr lang="en-US" sz="3200" dirty="0">
+                <a:solidFill>
+                  <a:schemeClr val="bg1"/>
+                </a:solidFill>
+                <a:latin typeface="+mj-lt"/>
+              </a:rPr>
+              <a:t>phân</a:t>
+            </a:r>
+            <a:r>
+              <a:rPr lang="en-US" sz="3600" dirty="0">
+                <a:solidFill>
+                  <a:schemeClr val="bg1"/>
+                </a:solidFill>
+                <a:latin typeface="+mj-lt"/>
+              </a:rPr>
+              <a:t> rã</a:t>
             </a:r>
           </a:p>
         </p:txBody>
@@ -19283,7 +19294,7 @@
         <p:spPr>
           <a:xfrm>
             <a:off x="8777412" y="9139196"/>
-            <a:ext cx="8065643" cy="523220"/>
+            <a:ext cx="8065643" cy="461665"/>
           </a:xfrm>
           <a:prstGeom prst="rect">
             <a:avLst/>
@@ -19302,11 +19313,11 @@
               </a:buClr>
             </a:pPr>
             <a:r>
-              <a:rPr lang="en-US" sz="2800" dirty="0">
+              <a:rPr lang="en-US" sz="2400" dirty="0">
                 <a:solidFill>
                   <a:schemeClr val="bg1"/>
                 </a:solidFill>
-                <a:latin typeface="Slabo 27px" panose="020B0604020202020204" charset="0"/>
+                <a:latin typeface="+mj-lt"/>
               </a:rPr>
               <a:t>Sơ đồ phân rã chức năng theo nhóm người dùng</a:t>
             </a:r>
@@ -19971,7 +19982,7 @@
         <p:spPr>
           <a:xfrm>
             <a:off x="1730794" y="4854547"/>
-            <a:ext cx="5915326" cy="707886"/>
+            <a:ext cx="5915326" cy="646331"/>
           </a:xfrm>
           <a:prstGeom prst="rect">
             <a:avLst/>
@@ -19990,11 +20001,11 @@
               </a:buClr>
             </a:pPr>
             <a:r>
-              <a:rPr lang="en-US" sz="4000" dirty="0">
+              <a:rPr lang="en-US" sz="3600" dirty="0">
                 <a:solidFill>
                   <a:schemeClr val="bg1"/>
                 </a:solidFill>
-                <a:latin typeface="Slabo 27px" panose="020B0604020202020204" charset="0"/>
+                <a:latin typeface="+mj-lt"/>
               </a:rPr>
               <a:t>Thiết kế dữ liệu</a:t>
             </a:r>
@@ -20016,7 +20027,7 @@
         <p:spPr>
           <a:xfrm>
             <a:off x="8640252" y="9606460"/>
-            <a:ext cx="8065643" cy="523220"/>
+            <a:ext cx="8065643" cy="461665"/>
           </a:xfrm>
           <a:prstGeom prst="rect">
             <a:avLst/>
@@ -20035,11 +20046,11 @@
               </a:buClr>
             </a:pPr>
             <a:r>
-              <a:rPr lang="en-US" sz="2800" dirty="0">
+              <a:rPr lang="en-US" sz="2400" dirty="0">
                 <a:solidFill>
                   <a:schemeClr val="bg1"/>
                 </a:solidFill>
-                <a:latin typeface="Slabo 27px" panose="020B0604020202020204" charset="0"/>
+                <a:latin typeface="+mj-lt"/>
               </a:rPr>
               <a:t>Sơ đồ lớp của hệ thống</a:t>
             </a:r>
@@ -20704,7 +20715,7 @@
         <p:spPr>
           <a:xfrm>
             <a:off x="1730794" y="4854547"/>
-            <a:ext cx="5915326" cy="707886"/>
+            <a:ext cx="5915326" cy="646331"/>
           </a:xfrm>
           <a:prstGeom prst="rect">
             <a:avLst/>
@@ -20723,11 +20734,11 @@
               </a:buClr>
             </a:pPr>
             <a:r>
-              <a:rPr lang="en-US" sz="4000" dirty="0">
+              <a:rPr lang="en-US" sz="3600" dirty="0">
                 <a:solidFill>
                   <a:schemeClr val="bg1"/>
                 </a:solidFill>
-                <a:latin typeface="Slabo 27px" panose="020B0604020202020204" charset="0"/>
+                <a:latin typeface="+mj-lt"/>
               </a:rPr>
               <a:t>Thiết kế giao diện</a:t>
             </a:r>
@@ -20749,7 +20760,7 @@
         <p:spPr>
           <a:xfrm>
             <a:off x="8640252" y="9606460"/>
-            <a:ext cx="8065643" cy="523220"/>
+            <a:ext cx="8065643" cy="461665"/>
           </a:xfrm>
           <a:prstGeom prst="rect">
             <a:avLst/>
@@ -20768,11 +20779,11 @@
               </a:buClr>
             </a:pPr>
             <a:r>
-              <a:rPr lang="en-US" sz="2800" dirty="0">
+              <a:rPr lang="en-US" sz="2400" dirty="0">
                 <a:solidFill>
                   <a:schemeClr val="bg1"/>
                 </a:solidFill>
-                <a:latin typeface="Slabo 27px" panose="020B0604020202020204" charset="0"/>
+                <a:latin typeface="+mj-lt"/>
               </a:rPr>
               <a:t>Giao diện trang chủ</a:t>
             </a:r>
@@ -21437,7 +21448,7 @@
         <p:spPr>
           <a:xfrm>
             <a:off x="1730794" y="4854547"/>
-            <a:ext cx="5915326" cy="707886"/>
+            <a:ext cx="5915326" cy="646331"/>
           </a:xfrm>
           <a:prstGeom prst="rect">
             <a:avLst/>
@@ -21456,11 +21467,11 @@
               </a:buClr>
             </a:pPr>
             <a:r>
-              <a:rPr lang="en-US" sz="4000" dirty="0">
+              <a:rPr lang="en-US" sz="3600" dirty="0">
                 <a:solidFill>
                   <a:schemeClr val="bg1"/>
                 </a:solidFill>
-                <a:latin typeface="Slabo 27px" panose="020B0604020202020204" charset="0"/>
+                <a:latin typeface="+mj-lt"/>
               </a:rPr>
               <a:t>Thiết kế giao diện</a:t>
             </a:r>
@@ -21482,7 +21493,7 @@
         <p:spPr>
           <a:xfrm>
             <a:off x="8166016" y="9656687"/>
-            <a:ext cx="8065643" cy="523220"/>
+            <a:ext cx="8065643" cy="461665"/>
           </a:xfrm>
           <a:prstGeom prst="rect">
             <a:avLst/>
@@ -21501,11 +21512,11 @@
               </a:buClr>
             </a:pPr>
             <a:r>
-              <a:rPr lang="en-US" sz="2800" dirty="0">
+              <a:rPr lang="en-US" sz="2400" dirty="0">
                 <a:solidFill>
                   <a:schemeClr val="bg1"/>
                 </a:solidFill>
-                <a:latin typeface="Slabo 27px" panose="020B0604020202020204" charset="0"/>
+                <a:latin typeface="+mj-lt"/>
               </a:rPr>
               <a:t>Giao diện đăng dự án</a:t>
             </a:r>
@@ -22170,7 +22181,7 @@
         <p:spPr>
           <a:xfrm>
             <a:off x="1730794" y="4854547"/>
-            <a:ext cx="5915326" cy="707886"/>
+            <a:ext cx="5915326" cy="646331"/>
           </a:xfrm>
           <a:prstGeom prst="rect">
             <a:avLst/>
@@ -22189,11 +22200,11 @@
               </a:buClr>
             </a:pPr>
             <a:r>
-              <a:rPr lang="en-US" sz="4000" dirty="0">
+              <a:rPr lang="en-US" sz="3600" dirty="0">
                 <a:solidFill>
                   <a:schemeClr val="bg1"/>
                 </a:solidFill>
-                <a:latin typeface="Slabo 27px" panose="020B0604020202020204" charset="0"/>
+                <a:latin typeface="+mj-lt"/>
               </a:rPr>
               <a:t>Thiết kế giao diện</a:t>
             </a:r>
@@ -22215,7 +22226,7 @@
         <p:spPr>
           <a:xfrm>
             <a:off x="8199862" y="9585125"/>
-            <a:ext cx="8065643" cy="523220"/>
+            <a:ext cx="8065643" cy="461665"/>
           </a:xfrm>
           <a:prstGeom prst="rect">
             <a:avLst/>
@@ -22234,11 +22245,11 @@
               </a:buClr>
             </a:pPr>
             <a:r>
-              <a:rPr lang="en-US" sz="2800" dirty="0">
+              <a:rPr lang="en-US" sz="2400" dirty="0">
                 <a:solidFill>
                   <a:schemeClr val="bg1"/>
                 </a:solidFill>
-                <a:latin typeface="Slabo 27px" panose="020B0604020202020204" charset="0"/>
+                <a:latin typeface="+mj-lt"/>
               </a:rPr>
               <a:t>Giao diện diễn đàn</a:t>
             </a:r>
@@ -22926,7 +22937,7 @@
                 <a:solidFill>
                   <a:schemeClr val="bg1"/>
                 </a:solidFill>
-                <a:latin typeface="Slabo 27px" panose="020B0604020202020204" charset="0"/>
+                <a:latin typeface="+mj-lt"/>
               </a:rPr>
               <a:t>Thiết kế chức năng</a:t>
             </a:r>
@@ -22948,7 +22959,7 @@
         <p:spPr>
           <a:xfrm>
             <a:off x="8174268" y="9656687"/>
-            <a:ext cx="8065643" cy="523220"/>
+            <a:ext cx="8065643" cy="461665"/>
           </a:xfrm>
           <a:prstGeom prst="rect">
             <a:avLst/>
@@ -22967,28 +22978,28 @@
               </a:buClr>
             </a:pPr>
             <a:r>
-              <a:rPr lang="en-US" sz="2800" dirty="0">
+              <a:rPr lang="en-US" sz="2400" dirty="0">
                 <a:solidFill>
                   <a:schemeClr val="bg1"/>
                 </a:solidFill>
-                <a:latin typeface="Slabo 27px" panose="020B0604020202020204" charset="0"/>
+                <a:latin typeface="+mj-lt"/>
               </a:rPr>
               <a:t>Sơ đồ tuần tự chức năng thanh toán bằng </a:t>
             </a:r>
             <a:r>
-              <a:rPr lang="en-US" sz="2800" dirty="0" err="1">
+              <a:rPr lang="en-US" sz="2400" dirty="0" err="1">
                 <a:solidFill>
                   <a:schemeClr val="bg1"/>
                 </a:solidFill>
-                <a:latin typeface="Slabo 27px" panose="020B0604020202020204" charset="0"/>
+                <a:latin typeface="+mj-lt"/>
               </a:rPr>
               <a:t>VNPay</a:t>
             </a:r>
-            <a:endParaRPr lang="en-US" sz="2800" dirty="0">
+            <a:endParaRPr lang="en-US" sz="2400" dirty="0">
               <a:solidFill>
                 <a:schemeClr val="bg1"/>
               </a:solidFill>
-              <a:latin typeface="Slabo 27px" panose="020B0604020202020204" charset="0"/>
+              <a:latin typeface="+mj-lt"/>
             </a:endParaRPr>
           </a:p>
         </p:txBody>
@@ -24099,7 +24110,7 @@
         <p:spPr>
           <a:xfrm>
             <a:off x="2844735" y="4017366"/>
-            <a:ext cx="10560949" cy="3785652"/>
+            <a:ext cx="10560949" cy="3477875"/>
           </a:xfrm>
           <a:prstGeom prst="rect">
             <a:avLst/>
@@ -24120,11 +24131,11 @@
               <a:buAutoNum type="arabicPeriod"/>
             </a:pPr>
             <a:r>
-              <a:rPr lang="en-US" sz="4800" dirty="0">
+              <a:rPr lang="en-US" sz="4400" dirty="0">
                 <a:solidFill>
                   <a:srgbClr val="FFFFFF"/>
                 </a:solidFill>
-                <a:latin typeface="Slabo 27px" panose="020B0604020202020204" charset="0"/>
+                <a:latin typeface="+mj-lt"/>
               </a:rPr>
               <a:t>Giới thiệu</a:t>
             </a:r>
@@ -24138,11 +24149,11 @@
               <a:buAutoNum type="arabicPeriod"/>
             </a:pPr>
             <a:r>
-              <a:rPr lang="en-US" sz="4800" dirty="0">
+              <a:rPr lang="en-US" sz="4400" dirty="0">
                 <a:solidFill>
                   <a:srgbClr val="FFFFFF"/>
                 </a:solidFill>
-                <a:latin typeface="Slabo 27px" panose="020B0604020202020204" charset="0"/>
+                <a:latin typeface="+mj-lt"/>
               </a:rPr>
               <a:t>Đặc tả yêu cầu</a:t>
             </a:r>
@@ -24156,11 +24167,11 @@
               <a:buAutoNum type="arabicPeriod"/>
             </a:pPr>
             <a:r>
-              <a:rPr lang="en-US" sz="4800" dirty="0">
+              <a:rPr lang="en-US" sz="4400" dirty="0">
                 <a:solidFill>
                   <a:srgbClr val="FFFFFF"/>
                 </a:solidFill>
-                <a:latin typeface="Slabo 27px" panose="020B0604020202020204" charset="0"/>
+                <a:latin typeface="+mj-lt"/>
               </a:rPr>
               <a:t>Thiết kế</a:t>
             </a:r>
@@ -24174,11 +24185,11 @@
               <a:buAutoNum type="arabicPeriod"/>
             </a:pPr>
             <a:r>
-              <a:rPr lang="en-US" sz="4800" dirty="0">
+              <a:rPr lang="en-US" sz="4400" dirty="0">
                 <a:solidFill>
                   <a:srgbClr val="FFFFFF"/>
                 </a:solidFill>
-                <a:latin typeface="Slabo 27px" panose="020B0604020202020204" charset="0"/>
+                <a:latin typeface="+mj-lt"/>
               </a:rPr>
               <a:t>Kiểm thử và đánh giá</a:t>
             </a:r>
@@ -24192,11 +24203,11 @@
               <a:buAutoNum type="arabicPeriod"/>
             </a:pPr>
             <a:r>
-              <a:rPr lang="en-US" sz="4800" dirty="0">
+              <a:rPr lang="en-US" sz="4400" dirty="0">
                 <a:solidFill>
                   <a:srgbClr val="FFFFFF"/>
                 </a:solidFill>
-                <a:latin typeface="Slabo 27px" panose="020B0604020202020204" charset="0"/>
+                <a:latin typeface="+mj-lt"/>
               </a:rPr>
               <a:t>Kết quả đạt được và hướng phát triển</a:t>
             </a:r>
@@ -25011,7 +25022,7 @@
         <p:spPr>
           <a:xfrm>
             <a:off x="1730794" y="4854547"/>
-            <a:ext cx="5915326" cy="707886"/>
+            <a:ext cx="5915326" cy="646331"/>
           </a:xfrm>
           <a:prstGeom prst="rect">
             <a:avLst/>
@@ -25030,11 +25041,11 @@
               </a:buClr>
             </a:pPr>
             <a:r>
-              <a:rPr lang="en-US" sz="4000" dirty="0">
+              <a:rPr lang="en-US" sz="3600" dirty="0">
                 <a:solidFill>
                   <a:schemeClr val="bg1"/>
                 </a:solidFill>
-                <a:latin typeface="Slabo 27px" panose="020B0604020202020204" charset="0"/>
+                <a:latin typeface="+mj-lt"/>
               </a:rPr>
               <a:t>Thiết kế chức năng</a:t>
             </a:r>
@@ -25056,7 +25067,7 @@
         <p:spPr>
           <a:xfrm>
             <a:off x="8174268" y="9656687"/>
-            <a:ext cx="8065643" cy="523220"/>
+            <a:ext cx="8065643" cy="461665"/>
           </a:xfrm>
           <a:prstGeom prst="rect">
             <a:avLst/>
@@ -25075,11 +25086,11 @@
               </a:buClr>
             </a:pPr>
             <a:r>
-              <a:rPr lang="en-US" sz="2800" dirty="0">
+              <a:rPr lang="en-US" sz="2400" dirty="0">
                 <a:solidFill>
                   <a:schemeClr val="bg1"/>
                 </a:solidFill>
-                <a:latin typeface="Slabo 27px" panose="020B0604020202020204" charset="0"/>
+                <a:latin typeface="+mj-lt"/>
               </a:rPr>
               <a:t>Sơ đồ tuần tự chức năng đăng dự án</a:t>
             </a:r>
@@ -25751,7 +25762,7 @@
         <p:spPr>
           <a:xfrm>
             <a:off x="1784400" y="4579018"/>
-            <a:ext cx="10141166" cy="2062103"/>
+            <a:ext cx="10141166" cy="1815882"/>
           </a:xfrm>
           <a:prstGeom prst="rect">
             <a:avLst/>
@@ -25772,11 +25783,11 @@
               <a:buChar char="v"/>
             </a:pPr>
             <a:r>
-              <a:rPr lang="en-US" sz="3200" dirty="0">
+              <a:rPr lang="en-US" sz="2800" dirty="0">
                 <a:solidFill>
                   <a:schemeClr val="bg1"/>
                 </a:solidFill>
-                <a:latin typeface="Fira Sans" panose="020B0503050000020004" pitchFamily="34" charset="0"/>
+                <a:latin typeface="+mj-lt"/>
               </a:rPr>
               <a:t>Phần cứng: AMD Ryzen 5, 8GB RAM, 256 ROM.</a:t>
             </a:r>
@@ -25790,11 +25801,11 @@
               <a:buChar char="v"/>
             </a:pPr>
             <a:r>
-              <a:rPr lang="en-US" sz="3200" dirty="0">
+              <a:rPr lang="en-US" sz="2800" dirty="0">
                 <a:solidFill>
                   <a:schemeClr val="bg1"/>
                 </a:solidFill>
-                <a:latin typeface="Fira Sans" panose="020B0503050000020004" pitchFamily="34" charset="0"/>
+                <a:latin typeface="+mj-lt"/>
               </a:rPr>
               <a:t>Hệ điều hành: Windows 10 22H2.</a:t>
             </a:r>
@@ -25808,11 +25819,11 @@
               <a:buChar char="v"/>
             </a:pPr>
             <a:r>
-              <a:rPr lang="en-US" sz="3200" dirty="0">
+              <a:rPr lang="en-US" sz="2800" dirty="0">
                 <a:solidFill>
                   <a:schemeClr val="bg1"/>
                 </a:solidFill>
-                <a:latin typeface="Fira Sans" panose="020B0503050000020004" pitchFamily="34" charset="0"/>
+                <a:latin typeface="+mj-lt"/>
               </a:rPr>
               <a:t>Trình duyệt: Chrome.</a:t>
             </a:r>
@@ -25826,11 +25837,11 @@
               <a:buChar char="v"/>
             </a:pPr>
             <a:r>
-              <a:rPr lang="en-US" sz="3200" dirty="0">
+              <a:rPr lang="en-US" sz="2800" dirty="0">
                 <a:solidFill>
                   <a:schemeClr val="bg1"/>
                 </a:solidFill>
-                <a:latin typeface="Fira Sans" panose="020B0503050000020004" pitchFamily="34" charset="0"/>
+                <a:latin typeface="+mj-lt"/>
               </a:rPr>
               <a:t>Môi trường NodeJS v21.4.</a:t>
             </a:r>
@@ -25852,7 +25863,7 @@
         <p:spPr>
           <a:xfrm>
             <a:off x="1784400" y="3792718"/>
-            <a:ext cx="10141166" cy="646331"/>
+            <a:ext cx="10141166" cy="584775"/>
           </a:xfrm>
           <a:prstGeom prst="rect">
             <a:avLst/>
@@ -25871,11 +25882,11 @@
               </a:buClr>
             </a:pPr>
             <a:r>
-              <a:rPr lang="en-US" sz="3600" dirty="0">
+              <a:rPr lang="en-US" sz="3200" dirty="0">
                 <a:solidFill>
                   <a:schemeClr val="bg1"/>
                 </a:solidFill>
-                <a:latin typeface="Fira Sans" panose="020B0503050000020004" pitchFamily="34" charset="0"/>
+                <a:latin typeface="+mj-lt"/>
               </a:rPr>
               <a:t>Môi trường kiểm thử</a:t>
             </a:r>
@@ -26510,7 +26521,7 @@
         <p:spPr>
           <a:xfrm>
             <a:off x="1552500" y="7157810"/>
-            <a:ext cx="10141166" cy="646331"/>
+            <a:ext cx="10141166" cy="584775"/>
           </a:xfrm>
           <a:prstGeom prst="rect">
             <a:avLst/>
@@ -26529,11 +26540,11 @@
               </a:buClr>
             </a:pPr>
             <a:r>
-              <a:rPr lang="en-US" sz="3600" dirty="0">
+              <a:rPr lang="en-US" sz="3200" dirty="0">
                 <a:solidFill>
                   <a:schemeClr val="bg1"/>
                 </a:solidFill>
-                <a:latin typeface="Fira Sans" panose="020B0503050000020004" pitchFamily="34" charset="0"/>
+                <a:latin typeface="+mj-lt"/>
               </a:rPr>
               <a:t>Các trường hợp kiểm thử</a:t>
             </a:r>
@@ -27221,7 +27232,7 @@
                 <a:solidFill>
                   <a:schemeClr val="bg1"/>
                 </a:solidFill>
-                <a:latin typeface="Fira Sans" panose="020B0503050000020004" pitchFamily="34" charset="0"/>
+                <a:latin typeface="+mj-lt"/>
               </a:rPr>
               <a:t>Kết quả kiểm thử - Đánh giá</a:t>
             </a:r>
@@ -27271,7 +27282,7 @@
                 <a:solidFill>
                   <a:schemeClr val="bg1"/>
                 </a:solidFill>
-                <a:latin typeface="Fira Sans" panose="020B0503050000020004" pitchFamily="34" charset="0"/>
+                <a:latin typeface="+mj-lt"/>
               </a:rPr>
               <a:t>Có tổng cộng 39 trường hợp kiểm thử.</a:t>
             </a:r>
@@ -27292,7 +27303,7 @@
                 <a:solidFill>
                   <a:schemeClr val="bg1"/>
                 </a:solidFill>
-                <a:latin typeface="Fira Sans" panose="020B0503050000020004" pitchFamily="34" charset="0"/>
+                <a:latin typeface="+mj-lt"/>
               </a:rPr>
               <a:t>Số trường hợp kiểm thử thành công: 39/39.</a:t>
             </a:r>
@@ -27313,7 +27324,7 @@
                 <a:solidFill>
                   <a:schemeClr val="bg1"/>
                 </a:solidFill>
-                <a:latin typeface="Fira Sans" panose="020B0503050000020004" pitchFamily="34" charset="0"/>
+                <a:latin typeface="+mj-lt"/>
               </a:rPr>
               <a:t>Số trường hợp kiểm thử thất bại: 0/39.</a:t>
             </a:r>
@@ -27332,7 +27343,7 @@
                 <a:solidFill>
                   <a:schemeClr val="bg1"/>
                 </a:solidFill>
-                <a:latin typeface="Fira Sans" panose="020B0503050000020004" pitchFamily="34" charset="0"/>
+                <a:latin typeface="+mj-lt"/>
                 <a:sym typeface="Wingdings" panose="05000000000000000000" pitchFamily="2" charset="2"/>
               </a:rPr>
               <a:t></a:t>
@@ -27342,7 +27353,7 @@
                 <a:solidFill>
                   <a:schemeClr val="bg1"/>
                 </a:solidFill>
-                <a:latin typeface="Fira Sans" panose="020B0503050000020004" pitchFamily="34" charset="0"/>
+                <a:latin typeface="+mj-lt"/>
               </a:rPr>
               <a:t>Kết quả cho thấy hệ thống hoạt động tốt và ổn định</a:t>
             </a:r>
@@ -27864,7 +27875,7 @@
                 <a:solidFill>
                   <a:schemeClr val="bg1"/>
                 </a:solidFill>
-                <a:latin typeface="Fira Sans" panose="020B0503050000020004" pitchFamily="34" charset="0"/>
+                <a:latin typeface="+mj-lt"/>
               </a:rPr>
               <a:t>Kết quả đạt được</a:t>
             </a:r>
@@ -27886,7 +27897,7 @@
         <p:spPr>
           <a:xfrm>
             <a:off x="1784399" y="5359119"/>
-            <a:ext cx="6323281" cy="4711803"/>
+            <a:ext cx="6323281" cy="4183709"/>
           </a:xfrm>
           <a:prstGeom prst="rect">
             <a:avLst/>
@@ -27912,7 +27923,7 @@
                 <a:solidFill>
                   <a:schemeClr val="bg1"/>
                 </a:solidFill>
-                <a:latin typeface="Fira Sans" panose="020B0503050000020004" pitchFamily="34" charset="0"/>
+                <a:latin typeface="+mj-lt"/>
               </a:rPr>
               <a:t>Về lý thuyết:</a:t>
             </a:r>
@@ -27929,46 +27940,46 @@
               <a:buChar char="v"/>
             </a:pPr>
             <a:r>
-              <a:rPr lang="vi-VN" sz="2800" dirty="0">
+              <a:rPr lang="vi-VN" sz="2400" dirty="0">
                 <a:solidFill>
                   <a:schemeClr val="bg1"/>
                 </a:solidFill>
-                <a:latin typeface="Fira Sans" panose="020B0503050000020004" pitchFamily="34" charset="0"/>
+                <a:latin typeface="+mn-lt"/>
               </a:rPr>
               <a:t>Củng cố và trao dồi các kiến thức </a:t>
             </a:r>
             <a:r>
-              <a:rPr lang="en-US" sz="2800" dirty="0">
+              <a:rPr lang="en-US" sz="2400" dirty="0">
                 <a:solidFill>
                   <a:schemeClr val="bg1"/>
                 </a:solidFill>
-                <a:latin typeface="Fira Sans" panose="020B0503050000020004" pitchFamily="34" charset="0"/>
+                <a:latin typeface="+mn-lt"/>
               </a:rPr>
               <a:t>đã học: </a:t>
             </a:r>
             <a:r>
-              <a:rPr lang="vi-VN" sz="2800" dirty="0">
+              <a:rPr lang="vi-VN" sz="2400" dirty="0">
                 <a:solidFill>
                   <a:schemeClr val="bg1"/>
                 </a:solidFill>
-                <a:latin typeface="Fira Sans" panose="020B0503050000020004" pitchFamily="34" charset="0"/>
+                <a:latin typeface="+mn-lt"/>
               </a:rPr>
               <a:t>phân tích, thiết kế</a:t>
             </a:r>
             <a:r>
-              <a:rPr lang="en-US" sz="2800" dirty="0">
+              <a:rPr lang="en-US" sz="2400" dirty="0">
                 <a:solidFill>
                   <a:schemeClr val="bg1"/>
                 </a:solidFill>
-                <a:latin typeface="Fira Sans" panose="020B0503050000020004" pitchFamily="34" charset="0"/>
+                <a:latin typeface="+mn-lt"/>
               </a:rPr>
               <a:t> CSDL, …</a:t>
             </a:r>
-            <a:endParaRPr lang="vi-VN" sz="2800" dirty="0">
+            <a:endParaRPr lang="vi-VN" sz="2400" dirty="0">
               <a:solidFill>
                 <a:schemeClr val="bg1"/>
               </a:solidFill>
-              <a:latin typeface="Fira Sans" panose="020B0503050000020004" pitchFamily="34" charset="0"/>
+              <a:latin typeface="+mn-lt"/>
             </a:endParaRPr>
           </a:p>
           <a:p>
@@ -27983,29 +27994,29 @@
               <a:buChar char="v"/>
             </a:pPr>
             <a:r>
-              <a:rPr lang="vi-VN" sz="2800" dirty="0">
+              <a:rPr lang="vi-VN" sz="2400" dirty="0">
                 <a:solidFill>
                   <a:schemeClr val="bg1"/>
                 </a:solidFill>
-                <a:latin typeface="Fira Sans" panose="020B0503050000020004" pitchFamily="34" charset="0"/>
+                <a:latin typeface="+mn-lt"/>
               </a:rPr>
               <a:t>Kết hợp ExpressJS, Handlebars và MySQL để xây dựng một sàn giao dịch </a:t>
             </a:r>
             <a:r>
-              <a:rPr lang="en-US" sz="2800" dirty="0">
+              <a:rPr lang="en-US" sz="2400" dirty="0">
                 <a:solidFill>
                   <a:schemeClr val="bg1"/>
                 </a:solidFill>
-                <a:latin typeface="Fira Sans" panose="020B0503050000020004" pitchFamily="34" charset="0"/>
+                <a:latin typeface="+mn-lt"/>
               </a:rPr>
               <a:t>trực tuyến</a:t>
             </a:r>
             <a:r>
-              <a:rPr lang="vi-VN" sz="2800" dirty="0">
+              <a:rPr lang="vi-VN" sz="2400" dirty="0">
                 <a:solidFill>
                   <a:schemeClr val="bg1"/>
                 </a:solidFill>
-                <a:latin typeface="Fira Sans" panose="020B0503050000020004" pitchFamily="34" charset="0"/>
+                <a:latin typeface="+mn-lt"/>
               </a:rPr>
               <a:t>. </a:t>
             </a:r>
@@ -28022,11 +28033,11 @@
               <a:buChar char="v"/>
             </a:pPr>
             <a:r>
-              <a:rPr lang="vi-VN" sz="2800" dirty="0">
+              <a:rPr lang="vi-VN" sz="2400" dirty="0">
                 <a:solidFill>
                   <a:schemeClr val="bg1"/>
                 </a:solidFill>
-                <a:latin typeface="Fira Sans" panose="020B0503050000020004" pitchFamily="34" charset="0"/>
+                <a:latin typeface="+mn-lt"/>
               </a:rPr>
               <a:t>Tìm hiểu và tích hợp thành công một diễn đàn cho website.</a:t>
             </a:r>
@@ -28044,7 +28055,7 @@
               <a:solidFill>
                 <a:schemeClr val="bg1"/>
               </a:solidFill>
-              <a:latin typeface="Fira Sans" panose="020B0503050000020004" pitchFamily="34" charset="0"/>
+              <a:latin typeface="+mj-lt"/>
             </a:endParaRPr>
           </a:p>
         </p:txBody>
@@ -28090,7 +28101,7 @@
                 <a:solidFill>
                   <a:schemeClr val="bg1"/>
                 </a:solidFill>
-                <a:latin typeface="Fira Sans" panose="020B0503050000020004" pitchFamily="34" charset="0"/>
+                <a:latin typeface="+mj-lt"/>
               </a:rPr>
               <a:t>Về chương trình:</a:t>
             </a:r>
@@ -28111,7 +28122,7 @@
                 <a:solidFill>
                   <a:schemeClr val="bg1"/>
                 </a:solidFill>
-                <a:latin typeface="Fira Sans" panose="020B0503050000020004" pitchFamily="34" charset="0"/>
+                <a:latin typeface="+mj-lt"/>
               </a:rPr>
               <a:t>Xây dựng sàn giao dịch trực tuyến đáp ứng các chức năng cơ bản.</a:t>
             </a:r>
@@ -28132,7 +28143,7 @@
                 <a:solidFill>
                   <a:schemeClr val="bg1"/>
                 </a:solidFill>
-                <a:latin typeface="Fira Sans" panose="020B0503050000020004" pitchFamily="34" charset="0"/>
+                <a:latin typeface="+mj-lt"/>
               </a:rPr>
               <a:t>Website dễ sử dụng và hoạt động ổn định</a:t>
             </a:r>
@@ -28150,7 +28161,7 @@
               <a:solidFill>
                 <a:schemeClr val="bg1"/>
               </a:solidFill>
-              <a:latin typeface="Fira Sans" panose="020B0503050000020004" pitchFamily="34" charset="0"/>
+              <a:latin typeface="+mj-lt"/>
             </a:endParaRPr>
           </a:p>
         </p:txBody>
@@ -28169,8 +28180,8 @@
         </p:nvSpPr>
         <p:spPr>
           <a:xfrm>
-            <a:off x="10180322" y="7349704"/>
-            <a:ext cx="8075881" cy="2126480"/>
+            <a:off x="10180323" y="7349704"/>
+            <a:ext cx="7559038" cy="1455014"/>
           </a:xfrm>
           <a:prstGeom prst="rect">
             <a:avLst/>
@@ -28196,7 +28207,7 @@
                 <a:solidFill>
                   <a:schemeClr val="bg1"/>
                 </a:solidFill>
-                <a:latin typeface="Fira Sans" panose="020B0503050000020004" pitchFamily="34" charset="0"/>
+                <a:latin typeface="+mj-lt"/>
               </a:rPr>
               <a:t>Về khả năng ứng dụng thực tiễn:</a:t>
             </a:r>
@@ -28213,20 +28224,20 @@
               <a:buChar char="v"/>
             </a:pPr>
             <a:r>
-              <a:rPr lang="en-US" sz="2800" dirty="0">
+              <a:rPr lang="en-US" sz="2400" dirty="0">
                 <a:solidFill>
                   <a:schemeClr val="bg1"/>
                 </a:solidFill>
-                <a:latin typeface="Fira Sans" panose="020B0503050000020004" pitchFamily="34" charset="0"/>
+                <a:latin typeface="+mj-lt"/>
               </a:rPr>
               <a:t>W</a:t>
             </a:r>
             <a:r>
-              <a:rPr lang="vi-VN" sz="2800" dirty="0">
+              <a:rPr lang="vi-VN" sz="2400" dirty="0">
                 <a:solidFill>
                   <a:schemeClr val="bg1"/>
                 </a:solidFill>
-                <a:latin typeface="Fira Sans" panose="020B0503050000020004" pitchFamily="34" charset="0"/>
+                <a:latin typeface="+mn-lt"/>
               </a:rPr>
               <a:t>ebsite đáp ứng được nhu cầu của người dùng và có thể được đưa vào ứng dụng thực tiễn</a:t>
             </a:r>
@@ -29056,7 +29067,7 @@
                 <a:solidFill>
                   <a:schemeClr val="bg1"/>
                 </a:solidFill>
-                <a:latin typeface="Fira Sans" panose="020B0503050000020004" pitchFamily="34" charset="0"/>
+                <a:latin typeface="+mj-lt"/>
               </a:rPr>
               <a:t>Hạn chế</a:t>
             </a:r>
@@ -29078,7 +29089,7 @@
         <p:spPr>
           <a:xfrm>
             <a:off x="1784399" y="5853626"/>
-            <a:ext cx="14472046" cy="2126480"/>
+            <a:ext cx="14472046" cy="1597938"/>
           </a:xfrm>
           <a:prstGeom prst="rect">
             <a:avLst/>
@@ -29106,7 +29117,8 @@
                 <a:solidFill>
                   <a:schemeClr val="bg1"/>
                 </a:solidFill>
-                <a:latin typeface="Fira Sans" panose="020B0503050000020004" pitchFamily="34" charset="0"/>
+                <a:latin typeface="+mj-lt"/>
+                <a:cs typeface="Times New Roman" panose="02020603050405020304" pitchFamily="18" charset="0"/>
               </a:rPr>
               <a:t>Giao diện còn đơn giản, một số tính năng chưa được hoàn thành do hạn chế thời gian thực hiện đề tài.</a:t>
             </a:r>
@@ -29127,7 +29139,8 @@
                 <a:solidFill>
                   <a:schemeClr val="bg1"/>
                 </a:solidFill>
-                <a:latin typeface="Fira Sans" panose="020B0503050000020004" pitchFamily="34" charset="0"/>
+                <a:latin typeface="+mj-lt"/>
+                <a:cs typeface="Times New Roman" panose="02020603050405020304" pitchFamily="18" charset="0"/>
               </a:rPr>
               <a:t>Tốc độ</a:t>
             </a:r>
@@ -29136,7 +29149,8 @@
                 <a:solidFill>
                   <a:schemeClr val="bg1"/>
                 </a:solidFill>
-                <a:latin typeface="Fira Sans" panose="020B0503050000020004" pitchFamily="34" charset="0"/>
+                <a:latin typeface="+mj-lt"/>
+                <a:cs typeface="Times New Roman" panose="02020603050405020304" pitchFamily="18" charset="0"/>
               </a:rPr>
               <a:t> lưu trữ </a:t>
             </a:r>
@@ -29145,7 +29159,8 @@
                 <a:solidFill>
                   <a:schemeClr val="bg1"/>
                 </a:solidFill>
-                <a:latin typeface="Fira Sans" panose="020B0503050000020004" pitchFamily="34" charset="0"/>
+                <a:latin typeface="+mj-lt"/>
+                <a:cs typeface="Times New Roman" panose="02020603050405020304" pitchFamily="18" charset="0"/>
               </a:rPr>
               <a:t>nhiều </a:t>
             </a:r>
@@ -29154,7 +29169,8 @@
                 <a:solidFill>
                   <a:schemeClr val="bg1"/>
                 </a:solidFill>
-                <a:latin typeface="Fira Sans" panose="020B0503050000020004" pitchFamily="34" charset="0"/>
+                <a:latin typeface="+mj-lt"/>
+                <a:cs typeface="Times New Roman" panose="02020603050405020304" pitchFamily="18" charset="0"/>
               </a:rPr>
               <a:t>hình ảnh và tập tin từ máy chủ lên Google Drive chưa được nhanh.</a:t>
             </a:r>
@@ -29740,7 +29756,7 @@
                 <a:solidFill>
                   <a:schemeClr val="bg1"/>
                 </a:solidFill>
-                <a:latin typeface="Fira Sans" panose="020B0503050000020004" pitchFamily="34" charset="0"/>
+                <a:latin typeface="+mj-lt"/>
               </a:rPr>
               <a:t>Hướng phát triển	</a:t>
             </a:r>
@@ -29790,7 +29806,7 @@
                 <a:solidFill>
                   <a:schemeClr val="bg1"/>
                 </a:solidFill>
-                <a:latin typeface="Fira Sans" panose="020B0503050000020004" pitchFamily="34" charset="0"/>
+                <a:latin typeface="+mn-lt"/>
               </a:rPr>
               <a:t>Tìm hiểu</a:t>
             </a:r>
@@ -29799,7 +29815,7 @@
                 <a:solidFill>
                   <a:schemeClr val="bg1"/>
                 </a:solidFill>
-                <a:latin typeface="Fira Sans" panose="020B0503050000020004" pitchFamily="34" charset="0"/>
+                <a:latin typeface="+mn-lt"/>
               </a:rPr>
               <a:t> và áp dụng</a:t>
             </a:r>
@@ -29808,7 +29824,7 @@
                 <a:solidFill>
                   <a:schemeClr val="bg1"/>
                 </a:solidFill>
-                <a:latin typeface="Fira Sans" panose="020B0503050000020004" pitchFamily="34" charset="0"/>
+                <a:latin typeface="+mn-lt"/>
               </a:rPr>
               <a:t> cách lưu trữ tệp khác để tăng tốc độ tải lên hình ảnh và tập tin</a:t>
             </a:r>
@@ -29829,7 +29845,7 @@
                 <a:solidFill>
                   <a:schemeClr val="bg1"/>
                 </a:solidFill>
-                <a:latin typeface="Fira Sans" panose="020B0503050000020004" pitchFamily="34" charset="0"/>
+                <a:latin typeface="+mn-lt"/>
               </a:rPr>
               <a:t>Áp dụng được mô hình MVC trong lập trình website.</a:t>
             </a:r>
@@ -29850,7 +29866,7 @@
                 <a:solidFill>
                   <a:schemeClr val="bg1"/>
                 </a:solidFill>
-                <a:latin typeface="Fira Sans" panose="020B0503050000020004" pitchFamily="34" charset="0"/>
+                <a:latin typeface="+mn-lt"/>
               </a:rPr>
               <a:t>Xây dựng thêm các tính năng kiểm duyệt nội dung</a:t>
             </a:r>
@@ -29859,7 +29875,7 @@
                 <a:solidFill>
                   <a:schemeClr val="bg1"/>
                 </a:solidFill>
-                <a:latin typeface="Fira Sans" panose="020B0503050000020004" pitchFamily="34" charset="0"/>
+                <a:latin typeface="+mn-lt"/>
               </a:rPr>
               <a:t> dự án và diễn đàn.</a:t>
             </a:r>
@@ -29867,7 +29883,7 @@
               <a:solidFill>
                 <a:schemeClr val="bg1"/>
               </a:solidFill>
-              <a:latin typeface="Fira Sans" panose="020B0503050000020004" pitchFamily="34" charset="0"/>
+              <a:latin typeface="+mn-lt"/>
             </a:endParaRPr>
           </a:p>
           <a:p>
@@ -29886,7 +29902,7 @@
                 <a:solidFill>
                   <a:schemeClr val="bg1"/>
                 </a:solidFill>
-                <a:latin typeface="Fira Sans" panose="020B0503050000020004" pitchFamily="34" charset="0"/>
+                <a:latin typeface="+mn-lt"/>
               </a:rPr>
               <a:t>Kiểm duyệt và quét các file được tải lên trước khi lưu trữ.</a:t>
             </a:r>
@@ -29894,7 +29910,7 @@
               <a:solidFill>
                 <a:schemeClr val="bg1"/>
               </a:solidFill>
-              <a:latin typeface="Fira Sans" panose="020B0503050000020004" pitchFamily="34" charset="0"/>
+              <a:latin typeface="+mn-lt"/>
             </a:endParaRPr>
           </a:p>
           <a:p>
@@ -29910,7 +29926,7 @@
               <a:solidFill>
                 <a:schemeClr val="bg1"/>
               </a:solidFill>
-              <a:latin typeface="Fira Sans" panose="020B0503050000020004" pitchFamily="34" charset="0"/>
+              <a:latin typeface="+mn-lt"/>
             </a:endParaRPr>
           </a:p>
         </p:txBody>
@@ -30171,7 +30187,7 @@
               <a:buNone/>
             </a:pPr>
             <a:r>
-              <a:rPr lang="en-US" sz="8000" b="0" i="0" u="none" strike="noStrike" cap="none">
+              <a:rPr lang="en-US" sz="8000" b="0" i="0" u="none" strike="noStrike" cap="none" dirty="0">
                 <a:solidFill>
                   <a:srgbClr val="FFD33B"/>
                 </a:solidFill>
@@ -30182,7 +30198,7 @@
               </a:rPr>
               <a:t>Thank you!</a:t>
             </a:r>
-            <a:endParaRPr/>
+            <a:endParaRPr dirty="0"/>
           </a:p>
         </p:txBody>
       </p:sp>
@@ -32159,7 +32175,7 @@
         <p:spPr>
           <a:xfrm>
             <a:off x="2036120" y="3171335"/>
-            <a:ext cx="4063635" cy="830997"/>
+            <a:ext cx="4063635" cy="769441"/>
           </a:xfrm>
           <a:prstGeom prst="rect">
             <a:avLst/>
@@ -32173,11 +32189,11 @@
           <a:lstStyle/>
           <a:p>
             <a:r>
-              <a:rPr lang="en-US" sz="4800" dirty="0">
+              <a:rPr lang="en-US" sz="4400" dirty="0">
                 <a:solidFill>
                   <a:schemeClr val="bg1"/>
                 </a:solidFill>
-                <a:latin typeface="Slabo 27px" panose="020B0604020202020204" charset="0"/>
+                <a:latin typeface="+mj-lt"/>
               </a:rPr>
               <a:t>Đặt vấn đề</a:t>
             </a:r>
@@ -32199,7 +32215,7 @@
         <p:spPr>
           <a:xfrm>
             <a:off x="2036120" y="4171609"/>
-            <a:ext cx="9077596" cy="3539430"/>
+            <a:ext cx="9077596" cy="3108543"/>
           </a:xfrm>
           <a:prstGeom prst="rect">
             <a:avLst/>
@@ -32220,11 +32236,11 @@
               <a:buChar char="v"/>
             </a:pPr>
             <a:r>
-              <a:rPr lang="en-US" sz="3200" dirty="0">
+              <a:rPr lang="en-US" sz="2800" dirty="0">
                 <a:solidFill>
                   <a:schemeClr val="bg1"/>
                 </a:solidFill>
-                <a:latin typeface="Slabo 27px" panose="020B0604020202020204" charset="0"/>
+                <a:latin typeface="+mj-lt"/>
               </a:rPr>
               <a:t>Nhu cầu giải trí tăng do áp lực từ học tập và công việc.</a:t>
             </a:r>
@@ -32238,11 +32254,11 @@
               <a:buChar char="v"/>
             </a:pPr>
             <a:r>
-              <a:rPr lang="en-US" sz="3200" dirty="0">
+              <a:rPr lang="en-US" sz="2800" dirty="0">
                 <a:solidFill>
                   <a:schemeClr val="bg1"/>
                 </a:solidFill>
-                <a:latin typeface="Slabo 27px" panose="020B0604020202020204" charset="0"/>
+                <a:latin typeface="+mj-lt"/>
               </a:rPr>
               <a:t>Sự phát triển mạnh mẽ của cộng đồng game Indie tại Việt Nam.</a:t>
             </a:r>
@@ -32256,11 +32272,11 @@
               <a:buChar char="v"/>
             </a:pPr>
             <a:r>
-              <a:rPr lang="en-US" sz="3200" dirty="0">
+              <a:rPr lang="en-US" sz="2800" dirty="0">
                 <a:solidFill>
                   <a:schemeClr val="bg1"/>
                 </a:solidFill>
-                <a:latin typeface="Slabo 27px" panose="020B0604020202020204" charset="0"/>
+                <a:latin typeface="+mj-lt"/>
               </a:rPr>
               <a:t>Lập trình viên cần một nền tảng để quảng bá và mua bán các dự án của mình.</a:t>
             </a:r>
@@ -32273,11 +32289,11 @@
               <a:buFont typeface="Wingdings" panose="05000000000000000000" pitchFamily="2" charset="2"/>
               <a:buChar char="v"/>
             </a:pPr>
-            <a:endParaRPr lang="en-US" sz="3200" dirty="0">
+            <a:endParaRPr lang="en-US" sz="2800" dirty="0">
               <a:solidFill>
                 <a:schemeClr val="bg1"/>
               </a:solidFill>
-              <a:latin typeface="Slabo 27px" panose="020B0604020202020204" charset="0"/>
+              <a:latin typeface="+mj-lt"/>
             </a:endParaRPr>
           </a:p>
         </p:txBody>
@@ -33244,7 +33260,7 @@
         <p:spPr>
           <a:xfrm>
             <a:off x="1835333" y="3166496"/>
-            <a:ext cx="8605156" cy="830997"/>
+            <a:ext cx="8605156" cy="769441"/>
           </a:xfrm>
           <a:prstGeom prst="rect">
             <a:avLst/>
@@ -33258,11 +33274,11 @@
           <a:lstStyle/>
           <a:p>
             <a:r>
-              <a:rPr lang="en-US" sz="4800" dirty="0">
+              <a:rPr lang="en-US" sz="4400" dirty="0">
                 <a:solidFill>
                   <a:schemeClr val="bg1"/>
                 </a:solidFill>
-                <a:latin typeface="Slabo 27px" panose="020B0604020202020204" charset="0"/>
+                <a:latin typeface="+mj-lt"/>
               </a:rPr>
               <a:t>Lịch sử giải quyết vấn đề</a:t>
             </a:r>
@@ -33284,7 +33300,7 @@
         <p:spPr>
           <a:xfrm>
             <a:off x="1854156" y="4120348"/>
-            <a:ext cx="9077596" cy="584775"/>
+            <a:ext cx="9077596" cy="523220"/>
           </a:xfrm>
           <a:prstGeom prst="rect">
             <a:avLst/>
@@ -33303,11 +33319,11 @@
               </a:buClr>
             </a:pPr>
             <a:r>
-              <a:rPr lang="en-US" sz="3200" dirty="0">
+              <a:rPr lang="en-US" sz="2800" dirty="0">
                 <a:solidFill>
                   <a:schemeClr val="bg1"/>
                 </a:solidFill>
-                <a:latin typeface="Slabo 27px" panose="020B0604020202020204" charset="0"/>
+                <a:latin typeface="+mj-lt"/>
               </a:rPr>
               <a:t>Ngoài nước</a:t>
             </a:r>
@@ -33421,7 +33437,7 @@
         <p:spPr>
           <a:xfrm>
             <a:off x="7086599" y="7229032"/>
-            <a:ext cx="8582298" cy="1613455"/>
+            <a:ext cx="8582298" cy="1381147"/>
           </a:xfrm>
           <a:prstGeom prst="rect">
             <a:avLst/>
@@ -33445,19 +33461,19 @@
               <a:buChar char="v"/>
             </a:pPr>
             <a:r>
-              <a:rPr lang="vi-VN" sz="2800" dirty="0">
+              <a:rPr lang="vi-VN" sz="2400" dirty="0">
                 <a:solidFill>
                   <a:schemeClr val="bg1"/>
                 </a:solidFill>
-                <a:latin typeface="Slabo 27px" panose="020B0604020202020204" charset="0"/>
+                <a:latin typeface="+mn-lt"/>
               </a:rPr>
               <a:t>Nền tảng phân phối trò chơi số lớn nhất trên thế giới</a:t>
             </a:r>
-            <a:endParaRPr lang="en-US" sz="2800" dirty="0">
+            <a:endParaRPr lang="en-US" sz="2400" dirty="0">
               <a:solidFill>
                 <a:schemeClr val="bg1"/>
               </a:solidFill>
-              <a:latin typeface="Slabo 27px" panose="020B0604020202020204" charset="0"/>
+              <a:latin typeface="+mn-lt"/>
             </a:endParaRPr>
           </a:p>
           <a:p>
@@ -33472,11 +33488,11 @@
               <a:buChar char="v"/>
             </a:pPr>
             <a:r>
-              <a:rPr lang="vi-VN" sz="2800" dirty="0">
+              <a:rPr lang="vi-VN" sz="2400" dirty="0">
                 <a:solidFill>
                   <a:schemeClr val="bg1"/>
                 </a:solidFill>
-                <a:latin typeface="Slabo 27px" panose="020B0604020202020204" charset="0"/>
+                <a:latin typeface="+mn-lt"/>
               </a:rPr>
               <a:t>Được phát triển và duy trì bởi Valve Corporation</a:t>
             </a:r>
@@ -33493,11 +33509,11 @@
               <a:buChar char="v"/>
             </a:pPr>
             <a:r>
-              <a:rPr lang="en-US" sz="2800" dirty="0">
+              <a:rPr lang="en-US" sz="2400" dirty="0">
                 <a:solidFill>
                   <a:schemeClr val="bg1"/>
                 </a:solidFill>
-                <a:latin typeface="Slabo 27px" panose="020B0604020202020204" charset="0"/>
+                <a:latin typeface="+mn-lt"/>
               </a:rPr>
               <a:t>Đa dạng thể lại trò chơi</a:t>
             </a:r>
@@ -33519,7 +33535,7 @@
         <p:spPr>
           <a:xfrm>
             <a:off x="7086599" y="4127318"/>
-            <a:ext cx="8582298" cy="2652842"/>
+            <a:ext cx="8582298" cy="2267544"/>
           </a:xfrm>
           <a:prstGeom prst="rect">
             <a:avLst/>
@@ -33543,19 +33559,19 @@
               <a:buChar char="v"/>
             </a:pPr>
             <a:r>
-              <a:rPr lang="vi-VN" sz="2800" dirty="0">
+              <a:rPr lang="vi-VN" sz="2400" dirty="0">
                 <a:solidFill>
                   <a:schemeClr val="bg1"/>
                 </a:solidFill>
-                <a:latin typeface="Slabo 27px" panose="020B0604020202020204" charset="0"/>
+                <a:latin typeface="+mn-lt"/>
               </a:rPr>
               <a:t>Được phát hành vào tháng 3 năm 2013 bởi Leaf Corcoran</a:t>
             </a:r>
-            <a:endParaRPr lang="en-US" sz="2800" dirty="0">
+            <a:endParaRPr lang="en-US" sz="2400" dirty="0">
               <a:solidFill>
                 <a:schemeClr val="bg1"/>
               </a:solidFill>
-              <a:latin typeface="Slabo 27px" panose="020B0604020202020204" charset="0"/>
+              <a:latin typeface="+mn-lt"/>
             </a:endParaRPr>
           </a:p>
           <a:p>
@@ -33570,13 +33586,13 @@
               <a:buChar char="v"/>
             </a:pPr>
             <a:r>
-              <a:rPr lang="en-US" sz="2800" dirty="0">
+              <a:rPr lang="en-US" sz="2400" dirty="0">
                 <a:solidFill>
                   <a:schemeClr val="bg1"/>
                 </a:solidFill>
-                <a:latin typeface="Slabo 27px" panose="020B0604020202020204" charset="0"/>
+                <a:latin typeface="+mn-lt"/>
               </a:rPr>
-              <a:t>Nền tảng cung cấp game Indie, tài nguyên phát triển game (2d art, character design, map, soundtrack,…</a:t>
+              <a:t>Nền tảng cung cấp game Indie, tài nguyên phát triển game (2d art, character design, map, soundtrack, …)</a:t>
             </a:r>
           </a:p>
           <a:p>
@@ -33591,11 +33607,11 @@
               <a:buChar char="v"/>
             </a:pPr>
             <a:r>
-              <a:rPr lang="en-US" sz="2800" dirty="0">
+              <a:rPr lang="en-US" sz="2400" dirty="0">
                 <a:solidFill>
                   <a:schemeClr val="bg1"/>
                 </a:solidFill>
-                <a:latin typeface="Slabo 27px" panose="020B0604020202020204" charset="0"/>
+                <a:latin typeface="+mn-lt"/>
               </a:rPr>
               <a:t>Hổ trợ nhiều tính năng hữu ích cho nhà phát triển game.</a:t>
             </a:r>
@@ -33612,11 +33628,11 @@
               <a:buChar char="v"/>
             </a:pPr>
             <a:r>
-              <a:rPr lang="en-US" sz="2800" dirty="0">
+              <a:rPr lang="en-US" sz="2400" dirty="0">
                 <a:solidFill>
                   <a:schemeClr val="bg1"/>
                 </a:solidFill>
-                <a:latin typeface="Slabo 27px" panose="020B0604020202020204" charset="0"/>
+                <a:latin typeface="+mn-lt"/>
               </a:rPr>
               <a:t>Người dùng có thể tổ chức Game Jam.</a:t>
             </a:r>
@@ -34471,7 +34487,25 @@
                 </a:solidFill>
                 <a:latin typeface="Slabo 27px" panose="020B0604020202020204" charset="0"/>
               </a:rPr>
-              <a:t>Lịch sử giải quyết vấn đề</a:t>
+              <a:t>Lịch sử </a:t>
+            </a:r>
+            <a:r>
+              <a:rPr lang="en-US" sz="4400" dirty="0" err="1">
+                <a:solidFill>
+                  <a:schemeClr val="bg1"/>
+                </a:solidFill>
+                <a:latin typeface="+mj-lt"/>
+              </a:rPr>
+              <a:t>gAiải</a:t>
+            </a:r>
+            <a:r>
+              <a:rPr lang="en-US" sz="4800" dirty="0">
+                <a:solidFill>
+                  <a:schemeClr val="bg1"/>
+                </a:solidFill>
+                <a:latin typeface="Slabo 27px" panose="020B0604020202020204" charset="0"/>
+              </a:rPr>
+              <a:t> quyết vấn đề</a:t>
             </a:r>
           </a:p>
         </p:txBody>
@@ -34491,7 +34525,7 @@
         <p:spPr>
           <a:xfrm>
             <a:off x="1854156" y="4120348"/>
-            <a:ext cx="9077596" cy="584775"/>
+            <a:ext cx="9077596" cy="523220"/>
           </a:xfrm>
           <a:prstGeom prst="rect">
             <a:avLst/>
@@ -34510,11 +34544,11 @@
               </a:buClr>
             </a:pPr>
             <a:r>
-              <a:rPr lang="en-US" sz="3200" dirty="0">
+              <a:rPr lang="en-US" sz="2800" dirty="0">
                 <a:solidFill>
                   <a:schemeClr val="bg1"/>
                 </a:solidFill>
-                <a:latin typeface="Slabo 27px" panose="020B0604020202020204" charset="0"/>
+                <a:latin typeface="+mj-lt"/>
               </a:rPr>
               <a:t>Trong nước</a:t>
             </a:r>
@@ -34536,7 +34570,7 @@
         <p:spPr>
           <a:xfrm>
             <a:off x="7040879" y="4901817"/>
-            <a:ext cx="8582298" cy="2130520"/>
+            <a:ext cx="8582298" cy="2113079"/>
           </a:xfrm>
           <a:prstGeom prst="rect">
             <a:avLst/>
@@ -34564,7 +34598,7 @@
                 <a:solidFill>
                   <a:schemeClr val="bg1"/>
                 </a:solidFill>
-                <a:latin typeface="Slabo 27px" panose="020B0604020202020204" charset="0"/>
+                <a:latin typeface="+mj-lt"/>
               </a:rPr>
               <a:t>Là website phân phối sản phẩm về Game bản quyền, Phần mềm, tiện ích hàng đầu Việt Nam.</a:t>
             </a:r>
@@ -34585,7 +34619,7 @@
                 <a:solidFill>
                   <a:schemeClr val="bg1"/>
                 </a:solidFill>
-                <a:latin typeface="Slabo 27px" panose="020B0604020202020204" charset="0"/>
+                <a:latin typeface="+mj-lt"/>
               </a:rPr>
               <a:t>Đa dạng sản phẩm từ trò chơi, phần mềm, key, tài khoản premium của các nền tảng lớn.</a:t>
             </a:r>
@@ -35467,7 +35501,7 @@
         <p:spPr>
           <a:xfrm>
             <a:off x="1835333" y="3166496"/>
-            <a:ext cx="8605156" cy="830997"/>
+            <a:ext cx="8605156" cy="769441"/>
           </a:xfrm>
           <a:prstGeom prst="rect">
             <a:avLst/>
@@ -35481,11 +35515,11 @@
           <a:lstStyle/>
           <a:p>
             <a:r>
-              <a:rPr lang="en-US" sz="4800" dirty="0">
+              <a:rPr lang="en-US" sz="4400" dirty="0">
                 <a:solidFill>
                   <a:schemeClr val="bg1"/>
                 </a:solidFill>
-                <a:latin typeface="Slabo 27px" panose="020B0604020202020204" charset="0"/>
+                <a:latin typeface="+mj-lt"/>
               </a:rPr>
               <a:t>Mục tiêu</a:t>
             </a:r>
@@ -35507,7 +35541,7 @@
         <p:spPr>
           <a:xfrm>
             <a:off x="1835333" y="4973240"/>
-            <a:ext cx="11297964" cy="1077218"/>
+            <a:ext cx="11297964" cy="954107"/>
           </a:xfrm>
           <a:prstGeom prst="rect">
             <a:avLst/>
@@ -35526,13 +35560,13 @@
               </a:buClr>
             </a:pPr>
             <a:r>
-              <a:rPr lang="en-US" sz="3200" dirty="0">
+              <a:rPr lang="en-US" sz="2800" dirty="0">
                 <a:solidFill>
                   <a:schemeClr val="bg1"/>
                 </a:solidFill>
-                <a:latin typeface="Slabo 27px" panose="020B0604020202020204" charset="0"/>
+                <a:latin typeface="+mj-lt"/>
               </a:rPr>
-              <a:t>Nghiên cứu xây dựng website sàn giao dịch trực tuyến chuyên về các sản phẩm game Indie.</a:t>
+              <a:t>    Nghiên cứu xây dựng website sàn giao dịch trực tuyến chuyên về các sản phẩm game Indie.</a:t>
             </a:r>
           </a:p>
         </p:txBody>
@@ -35691,7 +35725,7 @@
                 <a:solidFill>
                   <a:schemeClr val="bg1"/>
                 </a:solidFill>
-                <a:latin typeface="Slabo 27px" panose="020B0604020202020204" charset="0"/>
+                <a:latin typeface="+mj-lt"/>
               </a:rPr>
               <a:t>Tổng quát:</a:t>
             </a:r>
@@ -35713,7 +35747,7 @@
         <p:spPr>
           <a:xfrm>
             <a:off x="1792555" y="6966438"/>
-            <a:ext cx="11297964" cy="2062103"/>
+            <a:ext cx="11297964" cy="1815882"/>
           </a:xfrm>
           <a:prstGeom prst="rect">
             <a:avLst/>
@@ -35734,11 +35768,11 @@
               <a:buChar char="v"/>
             </a:pPr>
             <a:r>
-              <a:rPr lang="en-US" sz="3200" dirty="0">
+              <a:rPr lang="en-US" sz="2800" dirty="0">
                 <a:solidFill>
                   <a:schemeClr val="bg1"/>
                 </a:solidFill>
-                <a:latin typeface="Slabo 27px" panose="020B0604020202020204" charset="0"/>
+                <a:latin typeface="+mj-lt"/>
               </a:rPr>
               <a:t>Giúp người chơi dễ dàng tìm kiếm các tựa game Indie hay</a:t>
             </a:r>
@@ -35752,11 +35786,11 @@
               <a:buChar char="v"/>
             </a:pPr>
             <a:r>
-              <a:rPr lang="en-US" sz="3200" dirty="0">
+              <a:rPr lang="en-US" sz="2800" dirty="0">
                 <a:solidFill>
                   <a:schemeClr val="bg1"/>
                 </a:solidFill>
-                <a:latin typeface="Slabo 27px" panose="020B0604020202020204" charset="0"/>
+                <a:latin typeface="+mj-lt"/>
               </a:rPr>
               <a:t>Giúp nhà phát triển mang sản phẩm của mình đến với cộng đồng</a:t>
             </a:r>
@@ -35770,11 +35804,11 @@
               <a:buChar char="v"/>
             </a:pPr>
             <a:r>
-              <a:rPr lang="en-US" sz="3200" dirty="0">
+              <a:rPr lang="en-US" sz="2800" dirty="0">
                 <a:solidFill>
                   <a:schemeClr val="bg1"/>
                 </a:solidFill>
-                <a:latin typeface="Slabo 27px" panose="020B0604020202020204" charset="0"/>
+                <a:latin typeface="+mj-lt"/>
               </a:rPr>
               <a:t>Phát triển cộng đồng người chơi game Indie tại Việt Nam</a:t>
             </a:r>
@@ -35788,11 +35822,11 @@
               <a:buChar char="v"/>
             </a:pPr>
             <a:r>
-              <a:rPr lang="en-US" sz="3200" dirty="0">
+              <a:rPr lang="en-US" sz="2800" dirty="0">
                 <a:solidFill>
                   <a:schemeClr val="bg1"/>
                 </a:solidFill>
-                <a:latin typeface="Slabo 27px" panose="020B0604020202020204" charset="0"/>
+                <a:latin typeface="+mj-lt"/>
               </a:rPr>
               <a:t>Xây dựng một môi trường học lập trình hiệu quả</a:t>
             </a:r>
@@ -35832,7 +35866,7 @@
                 <a:solidFill>
                   <a:schemeClr val="bg1"/>
                 </a:solidFill>
-                <a:latin typeface="Slabo 27px" panose="020B0604020202020204" charset="0"/>
+                <a:latin typeface="+mj-lt"/>
               </a:rPr>
               <a:t>Cụ thể:</a:t>
             </a:r>
@@ -36546,7 +36580,7 @@
         <p:spPr>
           <a:xfrm>
             <a:off x="1835333" y="3166496"/>
-            <a:ext cx="8605156" cy="830997"/>
+            <a:ext cx="8605156" cy="769441"/>
           </a:xfrm>
           <a:prstGeom prst="rect">
             <a:avLst/>
@@ -36560,28 +36594,28 @@
           <a:lstStyle/>
           <a:p>
             <a:r>
-              <a:rPr lang="en-US" sz="4800" dirty="0">
+              <a:rPr lang="en-US" sz="4400" dirty="0">
                 <a:solidFill>
                   <a:schemeClr val="bg1"/>
                 </a:solidFill>
-                <a:latin typeface="Slabo 27px" panose="020B0604020202020204" charset="0"/>
+                <a:latin typeface="+mj-lt"/>
               </a:rPr>
               <a:t>Hướng giải </a:t>
             </a:r>
             <a:r>
-              <a:rPr lang="en-US" sz="3600" dirty="0">
+              <a:rPr lang="en-US" sz="3200" dirty="0">
                 <a:solidFill>
                   <a:schemeClr val="bg1"/>
                 </a:solidFill>
-                <a:latin typeface="Fira Sans" panose="020B0503050000020004" pitchFamily="34" charset="0"/>
+                <a:latin typeface="+mj-lt"/>
               </a:rPr>
               <a:t>quyết</a:t>
             </a:r>
-            <a:endParaRPr lang="en-US" sz="4800" dirty="0">
+            <a:endParaRPr lang="en-US" sz="4400" dirty="0">
               <a:solidFill>
                 <a:schemeClr val="bg1"/>
               </a:solidFill>
-              <a:latin typeface="Fira Sans" panose="020B0503050000020004" pitchFamily="34" charset="0"/>
+              <a:latin typeface="+mj-lt"/>
             </a:endParaRPr>
           </a:p>
         </p:txBody>
@@ -36747,7 +36781,7 @@
                 <a:solidFill>
                   <a:schemeClr val="bg1"/>
                 </a:solidFill>
-                <a:latin typeface="Fira Sans" panose="020B0503050000020004" pitchFamily="34" charset="0"/>
+                <a:latin typeface="+mj-lt"/>
               </a:rPr>
               <a:t>Tìm hiểu cách hoạt động của một sàn giao dịch trực tuyến.</a:t>
             </a:r>
@@ -36765,7 +36799,7 @@
                 <a:solidFill>
                   <a:schemeClr val="bg1"/>
                 </a:solidFill>
-                <a:latin typeface="Fira Sans" panose="020B0503050000020004" pitchFamily="34" charset="0"/>
+                <a:latin typeface="+mj-lt"/>
               </a:rPr>
               <a:t>Nghiên cứu và sử dụng </a:t>
             </a:r>
@@ -36774,7 +36808,7 @@
                 <a:solidFill>
                   <a:schemeClr val="bg1"/>
                 </a:solidFill>
-                <a:latin typeface="Fira Sans" panose="020B0503050000020004" pitchFamily="34" charset="0"/>
+                <a:latin typeface="+mj-lt"/>
               </a:rPr>
               <a:t>ExpressJS</a:t>
             </a:r>
@@ -36783,7 +36817,7 @@
                 <a:solidFill>
                   <a:schemeClr val="bg1"/>
                 </a:solidFill>
-                <a:latin typeface="Fira Sans" panose="020B0503050000020004" pitchFamily="34" charset="0"/>
+                <a:latin typeface="+mj-lt"/>
               </a:rPr>
               <a:t> và </a:t>
             </a:r>
@@ -36792,7 +36826,7 @@
                 <a:solidFill>
                   <a:schemeClr val="bg1"/>
                 </a:solidFill>
-                <a:latin typeface="Fira Sans" panose="020B0503050000020004" pitchFamily="34" charset="0"/>
+                <a:latin typeface="+mj-lt"/>
               </a:rPr>
               <a:t>HandlebarsJS</a:t>
             </a:r>
@@ -36801,7 +36835,7 @@
                 <a:solidFill>
                   <a:schemeClr val="bg1"/>
                 </a:solidFill>
-                <a:latin typeface="Fira Sans" panose="020B0503050000020004" pitchFamily="34" charset="0"/>
+                <a:latin typeface="+mj-lt"/>
               </a:rPr>
               <a:t> vào đề tài.</a:t>
             </a:r>
@@ -36819,7 +36853,7 @@
                 <a:solidFill>
                   <a:schemeClr val="bg1"/>
                 </a:solidFill>
-                <a:latin typeface="Fira Sans" panose="020B0503050000020004" pitchFamily="34" charset="0"/>
+                <a:latin typeface="+mj-lt"/>
               </a:rPr>
               <a:t>Tìm hiểu mô hình MVC trong lập trình Backend</a:t>
             </a:r>
@@ -37688,7 +37722,7 @@
                 <a:solidFill>
                   <a:schemeClr val="bg1"/>
                 </a:solidFill>
-                <a:latin typeface="Slabo 27px" panose="020B0604020202020204" charset="0"/>
+                <a:latin typeface="+mj-lt"/>
               </a:rPr>
               <a:t>Các yêu cầu chức năng</a:t>
             </a:r>
@@ -37831,7 +37865,7 @@
         <p:spPr>
           <a:xfrm>
             <a:off x="1792554" y="4312503"/>
-            <a:ext cx="13493166" cy="2062103"/>
+            <a:ext cx="13493166" cy="1815882"/>
           </a:xfrm>
           <a:prstGeom prst="rect">
             <a:avLst/>
@@ -37852,11 +37886,11 @@
               <a:buChar char="v"/>
             </a:pPr>
             <a:r>
-              <a:rPr lang="en-US" sz="3200" dirty="0">
+              <a:rPr lang="en-US" sz="2800" dirty="0">
                 <a:solidFill>
                   <a:schemeClr val="bg1"/>
                 </a:solidFill>
-                <a:latin typeface="Slabo 27px" panose="020B0604020202020204" charset="0"/>
+                <a:latin typeface="+mj-lt"/>
               </a:rPr>
               <a:t>Website phục vụ 2 nhóm người sử dụng: người dùng và quản trị viên</a:t>
             </a:r>
@@ -37870,11 +37904,11 @@
               <a:buChar char="v"/>
             </a:pPr>
             <a:r>
-              <a:rPr lang="en-US" sz="3200" dirty="0">
+              <a:rPr lang="en-US" sz="2800" dirty="0">
                 <a:solidFill>
                   <a:schemeClr val="bg1"/>
                 </a:solidFill>
-                <a:latin typeface="Slabo 27px" panose="020B0604020202020204" charset="0"/>
+                <a:latin typeface="+mj-lt"/>
               </a:rPr>
               <a:t>Cung cấp các chức năng của một sàn giao dịch trực tuyến: đăng bán, mua hàng, thanh toán trực tuyến, xuất hoá đơn, thống kê, …</a:t>
             </a:r>
@@ -37888,11 +37922,11 @@
               <a:buChar char="v"/>
             </a:pPr>
             <a:r>
-              <a:rPr lang="en-US" sz="3200" dirty="0">
+              <a:rPr lang="en-US" sz="2800" dirty="0">
                 <a:solidFill>
                   <a:schemeClr val="bg1"/>
                 </a:solidFill>
-                <a:latin typeface="Slabo 27px" panose="020B0604020202020204" charset="0"/>
+                <a:latin typeface="+mj-lt"/>
               </a:rPr>
               <a:t>Tích hợp diễn đàn cho phép đăng bài viết và thảo luận.</a:t>
             </a:r>
@@ -38693,7 +38727,7 @@
         <p:spPr>
           <a:xfrm>
             <a:off x="10402714" y="8995959"/>
-            <a:ext cx="6547596" cy="584775"/>
+            <a:ext cx="6547596" cy="523220"/>
           </a:xfrm>
           <a:prstGeom prst="rect">
             <a:avLst/>
@@ -38712,11 +38746,11 @@
               </a:buClr>
             </a:pPr>
             <a:r>
-              <a:rPr lang="en-US" sz="3200" dirty="0">
+              <a:rPr lang="en-US" sz="2800" dirty="0">
                 <a:solidFill>
                   <a:schemeClr val="bg1"/>
                 </a:solidFill>
-                <a:latin typeface="Slabo 27px" panose="020B0604020202020204" charset="0"/>
+                <a:latin typeface="+mj-lt"/>
               </a:rPr>
               <a:t>Sơ đồ use case tổng quát</a:t>
             </a:r>
@@ -38738,7 +38772,7 @@
         <p:spPr>
           <a:xfrm>
             <a:off x="1838008" y="6755088"/>
-            <a:ext cx="5279072" cy="707886"/>
+            <a:ext cx="5279072" cy="646331"/>
           </a:xfrm>
           <a:prstGeom prst="rect">
             <a:avLst/>
@@ -38757,11 +38791,11 @@
               </a:buClr>
             </a:pPr>
             <a:r>
-              <a:rPr lang="en-US" sz="4000" dirty="0">
+              <a:rPr lang="en-US" sz="3600" dirty="0">
                 <a:solidFill>
                   <a:schemeClr val="bg1"/>
                 </a:solidFill>
-                <a:latin typeface="Slabo 27px" panose="020B0604020202020204" charset="0"/>
+                <a:latin typeface="+mj-lt"/>
               </a:rPr>
               <a:t>Các yêu cầu chức năng</a:t>
             </a:r>

</xml_diff>

<commit_message>
docs: khá ok r
</commit_message>
<xml_diff>
--- a/docs/gameIndiePPT.pptx
+++ b/docs/gameIndiePPT.pptx
@@ -42,10 +42,6 @@
     <p:embeddedFont>
       <p:font typeface="Black Ops One" panose="020B0604020202020204" charset="0"/>
       <p:regular r:id="rId30"/>
-    </p:embeddedFont>
-    <p:embeddedFont>
-      <p:font typeface="Slabo 27px" panose="020B0604020202020204" charset="0"/>
-      <p:regular r:id="rId31"/>
     </p:embeddedFont>
   </p:embeddedFontLst>
   <p:defaultTextStyle>
@@ -2974,6 +2970,30 @@
             <a:noAutofit/>
           </a:bodyPr>
           <a:lstStyle/>
+          <a:p>
+            <a:pPr marL="0" lvl="0" indent="0" algn="l" rtl="0">
+              <a:spcBef>
+                <a:spcPts val="0"/>
+              </a:spcBef>
+              <a:spcAft>
+                <a:spcPts val="0"/>
+              </a:spcAft>
+              <a:buNone/>
+            </a:pPr>
+            <a:r>
+              <a:rPr lang="en-US" b="0" i="1" dirty="0">
+                <a:solidFill>
+                  <a:srgbClr val="202122"/>
+                </a:solidFill>
+                <a:effectLst/>
+                <a:highlight>
+                  <a:srgbClr val="FFFFFF"/>
+                </a:highlight>
+                <a:latin typeface="+mj-lt"/>
+              </a:rPr>
+              <a:t>Trong xã hội hiện đại ngày nay, mọi người đang ngày càng có nhiều áp lực trong công việc và học tập. Kéo theo nhu cầu giải trí ngày càng tăng.</a:t>
+            </a:r>
+          </a:p>
           <a:p>
             <a:pPr marL="0" lvl="0" indent="0" algn="l" rtl="0">
               <a:spcBef>
@@ -15251,16 +15271,8 @@
                 <a:latin typeface="Black Ops One"/>
                 <a:sym typeface="Black Ops One"/>
               </a:rPr>
-              <a:t>2. Đặc tả yêu cầu chức năng</a:t>
+              <a:t>Các yêu cầu chức năng</a:t>
             </a:r>
-            <a:endParaRPr sz="8000" dirty="0">
-              <a:solidFill>
-                <a:schemeClr val="bg1">
-                  <a:lumMod val="95000"/>
-                </a:schemeClr>
-              </a:solidFill>
-              <a:latin typeface="Black Ops One"/>
-            </a:endParaRPr>
           </a:p>
         </p:txBody>
       </p:sp>
@@ -15853,51 +15865,6 @@
       </p:grpSp>
       <p:sp>
         <p:nvSpPr>
-          <p:cNvPr id="13" name="TextBox 12">
-            <a:extLst>
-              <a:ext uri="{FF2B5EF4-FFF2-40B4-BE49-F238E27FC236}">
-                <a16:creationId xmlns:a16="http://schemas.microsoft.com/office/drawing/2014/main" id="{1DE7A850-D9CC-E053-C6C6-5CAEF5F6FA6A}"/>
-              </a:ext>
-            </a:extLst>
-          </p:cNvPr>
-          <p:cNvSpPr txBox="1"/>
-          <p:nvPr/>
-        </p:nvSpPr>
-        <p:spPr>
-          <a:xfrm>
-            <a:off x="1838008" y="6755088"/>
-            <a:ext cx="5279072" cy="646331"/>
-          </a:xfrm>
-          <a:prstGeom prst="rect">
-            <a:avLst/>
-          </a:prstGeom>
-          <a:noFill/>
-        </p:spPr>
-        <p:txBody>
-          <a:bodyPr wrap="square" rtlCol="0">
-            <a:spAutoFit/>
-          </a:bodyPr>
-          <a:lstStyle/>
-          <a:p>
-            <a:pPr>
-              <a:buClr>
-                <a:schemeClr val="bg1"/>
-              </a:buClr>
-            </a:pPr>
-            <a:r>
-              <a:rPr lang="en-US" sz="3600" dirty="0">
-                <a:solidFill>
-                  <a:schemeClr val="bg1"/>
-                </a:solidFill>
-                <a:latin typeface="+mj-lt"/>
-              </a:rPr>
-              <a:t>Các yêu cầu chức năng</a:t>
-            </a:r>
-          </a:p>
-        </p:txBody>
-      </p:sp>
-      <p:sp>
-        <p:nvSpPr>
           <p:cNvPr id="5" name="TextBox 4">
             <a:extLst>
               <a:ext uri="{FF2B5EF4-FFF2-40B4-BE49-F238E27FC236}">
@@ -16120,16 +16087,8 @@
                 <a:latin typeface="Black Ops One"/>
                 <a:sym typeface="Black Ops One"/>
               </a:rPr>
-              <a:t>2. Đặc tả yêu cầu chức năng</a:t>
+              <a:t>Các yêu cầu chức năng</a:t>
             </a:r>
-            <a:endParaRPr sz="8000" dirty="0">
-              <a:solidFill>
-                <a:schemeClr val="bg1">
-                  <a:lumMod val="95000"/>
-                </a:schemeClr>
-              </a:solidFill>
-              <a:latin typeface="Black Ops One"/>
-            </a:endParaRPr>
           </a:p>
         </p:txBody>
       </p:sp>
@@ -16722,51 +16681,6 @@
       </p:grpSp>
       <p:sp>
         <p:nvSpPr>
-          <p:cNvPr id="13" name="TextBox 12">
-            <a:extLst>
-              <a:ext uri="{FF2B5EF4-FFF2-40B4-BE49-F238E27FC236}">
-                <a16:creationId xmlns:a16="http://schemas.microsoft.com/office/drawing/2014/main" id="{1DE7A850-D9CC-E053-C6C6-5CAEF5F6FA6A}"/>
-              </a:ext>
-            </a:extLst>
-          </p:cNvPr>
-          <p:cNvSpPr txBox="1"/>
-          <p:nvPr/>
-        </p:nvSpPr>
-        <p:spPr>
-          <a:xfrm>
-            <a:off x="1838008" y="6755088"/>
-            <a:ext cx="5279072" cy="646331"/>
-          </a:xfrm>
-          <a:prstGeom prst="rect">
-            <a:avLst/>
-          </a:prstGeom>
-          <a:noFill/>
-        </p:spPr>
-        <p:txBody>
-          <a:bodyPr wrap="square" rtlCol="0">
-            <a:spAutoFit/>
-          </a:bodyPr>
-          <a:lstStyle/>
-          <a:p>
-            <a:pPr>
-              <a:buClr>
-                <a:schemeClr val="bg1"/>
-              </a:buClr>
-            </a:pPr>
-            <a:r>
-              <a:rPr lang="en-US" sz="3600" dirty="0">
-                <a:solidFill>
-                  <a:schemeClr val="bg1"/>
-                </a:solidFill>
-                <a:latin typeface="+mj-lt"/>
-              </a:rPr>
-              <a:t>Các yêu cầu chức năng</a:t>
-            </a:r>
-          </a:p>
-        </p:txBody>
-      </p:sp>
-      <p:sp>
-        <p:nvSpPr>
           <p:cNvPr id="5" name="TextBox 4">
             <a:extLst>
               <a:ext uri="{FF2B5EF4-FFF2-40B4-BE49-F238E27FC236}">
@@ -16988,16 +16902,8 @@
                 <a:latin typeface="Black Ops One"/>
                 <a:sym typeface="Black Ops One"/>
               </a:rPr>
-              <a:t>2. Đặc tả yêu cầu chức năng</a:t>
+              <a:t>Các yêu cầu phi chức năng</a:t>
             </a:r>
-            <a:endParaRPr sz="8000" dirty="0">
-              <a:solidFill>
-                <a:schemeClr val="bg1">
-                  <a:lumMod val="95000"/>
-                </a:schemeClr>
-              </a:solidFill>
-              <a:latin typeface="Black Ops One"/>
-            </a:endParaRPr>
           </a:p>
         </p:txBody>
       </p:sp>
@@ -17590,51 +17496,6 @@
       </p:grpSp>
       <p:sp>
         <p:nvSpPr>
-          <p:cNvPr id="13" name="TextBox 12">
-            <a:extLst>
-              <a:ext uri="{FF2B5EF4-FFF2-40B4-BE49-F238E27FC236}">
-                <a16:creationId xmlns:a16="http://schemas.microsoft.com/office/drawing/2014/main" id="{1DE7A850-D9CC-E053-C6C6-5CAEF5F6FA6A}"/>
-              </a:ext>
-            </a:extLst>
-          </p:cNvPr>
-          <p:cNvSpPr txBox="1"/>
-          <p:nvPr/>
-        </p:nvSpPr>
-        <p:spPr>
-          <a:xfrm>
-            <a:off x="1838007" y="3340753"/>
-            <a:ext cx="5915326" cy="646331"/>
-          </a:xfrm>
-          <a:prstGeom prst="rect">
-            <a:avLst/>
-          </a:prstGeom>
-          <a:noFill/>
-        </p:spPr>
-        <p:txBody>
-          <a:bodyPr wrap="square" rtlCol="0">
-            <a:spAutoFit/>
-          </a:bodyPr>
-          <a:lstStyle/>
-          <a:p>
-            <a:pPr>
-              <a:buClr>
-                <a:schemeClr val="bg1"/>
-              </a:buClr>
-            </a:pPr>
-            <a:r>
-              <a:rPr lang="en-US" sz="3600" dirty="0">
-                <a:solidFill>
-                  <a:schemeClr val="bg1"/>
-                </a:solidFill>
-                <a:latin typeface="+mj-lt"/>
-              </a:rPr>
-              <a:t>Các yêu cầu phi chức năng</a:t>
-            </a:r>
-          </a:p>
-        </p:txBody>
-      </p:sp>
-      <p:sp>
-        <p:nvSpPr>
           <p:cNvPr id="7" name="TextBox 6">
             <a:extLst>
               <a:ext uri="{FF2B5EF4-FFF2-40B4-BE49-F238E27FC236}">
@@ -17647,7 +17508,7 @@
         </p:nvSpPr>
         <p:spPr>
           <a:xfrm>
-            <a:off x="1818940" y="4260201"/>
+            <a:off x="1681780" y="3694017"/>
             <a:ext cx="10525460" cy="2677656"/>
           </a:xfrm>
           <a:prstGeom prst="rect">
@@ -17883,16 +17744,8 @@
                 <a:latin typeface="Black Ops One"/>
                 <a:sym typeface="Black Ops One"/>
               </a:rPr>
-              <a:t>3. Thiết kế</a:t>
+              <a:t>Thiết kế kiến trúc</a:t>
             </a:r>
-            <a:endParaRPr sz="8000" dirty="0">
-              <a:solidFill>
-                <a:schemeClr val="bg1">
-                  <a:lumMod val="95000"/>
-                </a:schemeClr>
-              </a:solidFill>
-              <a:latin typeface="Black Ops One"/>
-            </a:endParaRPr>
           </a:p>
         </p:txBody>
       </p:sp>
@@ -18483,51 +18336,6 @@
           </p:txBody>
         </p:sp>
       </p:grpSp>
-      <p:sp>
-        <p:nvSpPr>
-          <p:cNvPr id="13" name="TextBox 12">
-            <a:extLst>
-              <a:ext uri="{FF2B5EF4-FFF2-40B4-BE49-F238E27FC236}">
-                <a16:creationId xmlns:a16="http://schemas.microsoft.com/office/drawing/2014/main" id="{1DE7A850-D9CC-E053-C6C6-5CAEF5F6FA6A}"/>
-              </a:ext>
-            </a:extLst>
-          </p:cNvPr>
-          <p:cNvSpPr txBox="1"/>
-          <p:nvPr/>
-        </p:nvSpPr>
-        <p:spPr>
-          <a:xfrm>
-            <a:off x="1706053" y="5604730"/>
-            <a:ext cx="5915326" cy="646331"/>
-          </a:xfrm>
-          <a:prstGeom prst="rect">
-            <a:avLst/>
-          </a:prstGeom>
-          <a:noFill/>
-        </p:spPr>
-        <p:txBody>
-          <a:bodyPr wrap="square" rtlCol="0">
-            <a:spAutoFit/>
-          </a:bodyPr>
-          <a:lstStyle/>
-          <a:p>
-            <a:pPr>
-              <a:buClr>
-                <a:schemeClr val="bg1"/>
-              </a:buClr>
-            </a:pPr>
-            <a:r>
-              <a:rPr lang="en-US" sz="3600" dirty="0">
-                <a:solidFill>
-                  <a:schemeClr val="bg1"/>
-                </a:solidFill>
-                <a:latin typeface="+mj-lt"/>
-              </a:rPr>
-              <a:t>Thiết kế kiến trúc</a:t>
-            </a:r>
-          </a:p>
-        </p:txBody>
-      </p:sp>
       <p:pic>
         <p:nvPicPr>
           <p:cNvPr id="5" name="Picture 4" descr="A diagram of a server&#10;&#10;Description automatically generated">
@@ -18550,8 +18358,8 @@
         </p:blipFill>
         <p:spPr>
           <a:xfrm>
-            <a:off x="7136904" y="2952972"/>
-            <a:ext cx="10689976" cy="5923465"/>
+            <a:off x="4042024" y="3038102"/>
+            <a:ext cx="10756015" cy="5960058"/>
           </a:xfrm>
           <a:prstGeom prst="rect">
             <a:avLst/>
@@ -18572,7 +18380,7 @@
         </p:nvSpPr>
         <p:spPr>
           <a:xfrm>
-            <a:off x="9387013" y="9031944"/>
+            <a:off x="6429350" y="9222337"/>
             <a:ext cx="5915326" cy="461665"/>
           </a:xfrm>
           <a:prstGeom prst="rect">
@@ -31584,7 +31392,7 @@
         </p:nvSpPr>
         <p:spPr>
           <a:xfrm rot="6122049">
-            <a:off x="-2401788" y="-2709637"/>
+            <a:off x="-2059482" y="-2917246"/>
             <a:ext cx="5418782" cy="5834490"/>
           </a:xfrm>
           <a:custGeom>
@@ -31642,8 +31450,8 @@
         </p:nvSpPr>
         <p:spPr>
           <a:xfrm>
-            <a:off x="1183065" y="1562709"/>
-            <a:ext cx="7018020" cy="1477328"/>
+            <a:off x="2125980" y="1510914"/>
+            <a:ext cx="7018020" cy="2954655"/>
           </a:xfrm>
           <a:prstGeom prst="rect">
             <a:avLst/>
@@ -31681,9 +31489,23 @@
                 <a:latin typeface="Black Ops One"/>
                 <a:sym typeface="Black Ops One"/>
               </a:rPr>
-              <a:t>1. Giới thiệu</a:t>
+              <a:t>Đặt vấn đề</a:t>
             </a:r>
-            <a:endParaRPr sz="8000" dirty="0">
+          </a:p>
+          <a:p>
+            <a:pPr marL="0" marR="0" lvl="0" indent="0" algn="l" rtl="0">
+              <a:lnSpc>
+                <a:spcPct val="120000"/>
+              </a:lnSpc>
+              <a:spcBef>
+                <a:spcPts val="0"/>
+              </a:spcBef>
+              <a:spcAft>
+                <a:spcPts val="0"/>
+              </a:spcAft>
+              <a:buNone/>
+            </a:pPr>
+            <a:endParaRPr lang="en-US" sz="8000" dirty="0">
               <a:solidFill>
                 <a:schemeClr val="bg1">
                   <a:lumMod val="95000"/>
@@ -32157,46 +31979,6 @@
           <a:lstStyle/>
           <a:p>
             <a:endParaRPr lang="en-US"/>
-          </a:p>
-        </p:txBody>
-      </p:sp>
-      <p:sp>
-        <p:nvSpPr>
-          <p:cNvPr id="5" name="TextBox 4">
-            <a:extLst>
-              <a:ext uri="{FF2B5EF4-FFF2-40B4-BE49-F238E27FC236}">
-                <a16:creationId xmlns:a16="http://schemas.microsoft.com/office/drawing/2014/main" id="{C8A032E1-462B-9F50-0169-C7B1E7247B4D}"/>
-              </a:ext>
-            </a:extLst>
-          </p:cNvPr>
-          <p:cNvSpPr txBox="1"/>
-          <p:nvPr/>
-        </p:nvSpPr>
-        <p:spPr>
-          <a:xfrm>
-            <a:off x="2036120" y="3171335"/>
-            <a:ext cx="4063635" cy="769441"/>
-          </a:xfrm>
-          <a:prstGeom prst="rect">
-            <a:avLst/>
-          </a:prstGeom>
-          <a:noFill/>
-        </p:spPr>
-        <p:txBody>
-          <a:bodyPr wrap="square" rtlCol="0">
-            <a:spAutoFit/>
-          </a:bodyPr>
-          <a:lstStyle/>
-          <a:p>
-            <a:r>
-              <a:rPr lang="en-US" sz="4400" dirty="0">
-                <a:solidFill>
-                  <a:schemeClr val="bg1"/>
-                </a:solidFill>
-                <a:latin typeface="+mj-lt"/>
-              </a:rPr>
-              <a:t>Đặt vấn đề</a:t>
-            </a:r>
           </a:p>
         </p:txBody>
       </p:sp>
@@ -32727,8 +32509,8 @@
         </p:nvSpPr>
         <p:spPr>
           <a:xfrm>
-            <a:off x="1838009" y="1563582"/>
-            <a:ext cx="7018020" cy="1477328"/>
+            <a:off x="1838008" y="1563582"/>
+            <a:ext cx="13996352" cy="1477328"/>
           </a:xfrm>
           <a:prstGeom prst="rect">
             <a:avLst/>
@@ -32766,16 +32548,8 @@
                 <a:latin typeface="Black Ops One"/>
                 <a:sym typeface="Black Ops One"/>
               </a:rPr>
-              <a:t>1. Giới thiệu</a:t>
+              <a:t>Lịch sử giải quyết vấn đề</a:t>
             </a:r>
-            <a:endParaRPr sz="8000" dirty="0">
-              <a:solidFill>
-                <a:schemeClr val="bg1">
-                  <a:lumMod val="95000"/>
-                </a:schemeClr>
-              </a:solidFill>
-              <a:latin typeface="Black Ops One"/>
-            </a:endParaRPr>
           </a:p>
         </p:txBody>
       </p:sp>
@@ -33247,46 +33021,6 @@
       </p:sp>
       <p:sp>
         <p:nvSpPr>
-          <p:cNvPr id="5" name="TextBox 4">
-            <a:extLst>
-              <a:ext uri="{FF2B5EF4-FFF2-40B4-BE49-F238E27FC236}">
-                <a16:creationId xmlns:a16="http://schemas.microsoft.com/office/drawing/2014/main" id="{C8A032E1-462B-9F50-0169-C7B1E7247B4D}"/>
-              </a:ext>
-            </a:extLst>
-          </p:cNvPr>
-          <p:cNvSpPr txBox="1"/>
-          <p:nvPr/>
-        </p:nvSpPr>
-        <p:spPr>
-          <a:xfrm>
-            <a:off x="1835333" y="3166496"/>
-            <a:ext cx="8605156" cy="769441"/>
-          </a:xfrm>
-          <a:prstGeom prst="rect">
-            <a:avLst/>
-          </a:prstGeom>
-          <a:noFill/>
-        </p:spPr>
-        <p:txBody>
-          <a:bodyPr wrap="square" rtlCol="0">
-            <a:spAutoFit/>
-          </a:bodyPr>
-          <a:lstStyle/>
-          <a:p>
-            <a:r>
-              <a:rPr lang="en-US" sz="4400" dirty="0">
-                <a:solidFill>
-                  <a:schemeClr val="bg1"/>
-                </a:solidFill>
-                <a:latin typeface="+mj-lt"/>
-              </a:rPr>
-              <a:t>Lịch sử giải quyết vấn đề</a:t>
-            </a:r>
-          </a:p>
-        </p:txBody>
-      </p:sp>
-      <p:sp>
-        <p:nvSpPr>
           <p:cNvPr id="7" name="TextBox 6">
             <a:extLst>
               <a:ext uri="{FF2B5EF4-FFF2-40B4-BE49-F238E27FC236}">
@@ -33299,7 +33033,7 @@
         </p:nvSpPr>
         <p:spPr>
           <a:xfrm>
-            <a:off x="1854156" y="4120348"/>
+            <a:off x="1854156" y="3538018"/>
             <a:ext cx="9077596" cy="523220"/>
           </a:xfrm>
           <a:prstGeom prst="rect">
@@ -33934,8 +33668,8 @@
         </p:nvSpPr>
         <p:spPr>
           <a:xfrm>
-            <a:off x="1838009" y="1563582"/>
-            <a:ext cx="7018020" cy="1477328"/>
+            <a:off x="1838008" y="1563582"/>
+            <a:ext cx="14468791" cy="1477328"/>
           </a:xfrm>
           <a:prstGeom prst="rect">
             <a:avLst/>
@@ -33973,16 +33707,8 @@
                 <a:latin typeface="Black Ops One"/>
                 <a:sym typeface="Black Ops One"/>
               </a:rPr>
-              <a:t>1. Giới thiệu</a:t>
+              <a:t>Lịch sử giải quyết vấn đề</a:t>
             </a:r>
-            <a:endParaRPr sz="8000" dirty="0">
-              <a:solidFill>
-                <a:schemeClr val="bg1">
-                  <a:lumMod val="95000"/>
-                </a:schemeClr>
-              </a:solidFill>
-              <a:latin typeface="Black Ops One"/>
-            </a:endParaRPr>
           </a:p>
         </p:txBody>
       </p:sp>
@@ -34454,64 +34180,6 @@
       </p:sp>
       <p:sp>
         <p:nvSpPr>
-          <p:cNvPr id="5" name="TextBox 4">
-            <a:extLst>
-              <a:ext uri="{FF2B5EF4-FFF2-40B4-BE49-F238E27FC236}">
-                <a16:creationId xmlns:a16="http://schemas.microsoft.com/office/drawing/2014/main" id="{C8A032E1-462B-9F50-0169-C7B1E7247B4D}"/>
-              </a:ext>
-            </a:extLst>
-          </p:cNvPr>
-          <p:cNvSpPr txBox="1"/>
-          <p:nvPr/>
-        </p:nvSpPr>
-        <p:spPr>
-          <a:xfrm>
-            <a:off x="1835333" y="3166496"/>
-            <a:ext cx="8605156" cy="830997"/>
-          </a:xfrm>
-          <a:prstGeom prst="rect">
-            <a:avLst/>
-          </a:prstGeom>
-          <a:noFill/>
-        </p:spPr>
-        <p:txBody>
-          <a:bodyPr wrap="square" rtlCol="0">
-            <a:spAutoFit/>
-          </a:bodyPr>
-          <a:lstStyle/>
-          <a:p>
-            <a:r>
-              <a:rPr lang="en-US" sz="4800" dirty="0">
-                <a:solidFill>
-                  <a:schemeClr val="bg1"/>
-                </a:solidFill>
-                <a:latin typeface="Slabo 27px" panose="020B0604020202020204" charset="0"/>
-              </a:rPr>
-              <a:t>Lịch sử </a:t>
-            </a:r>
-            <a:r>
-              <a:rPr lang="en-US" sz="4400" dirty="0" err="1">
-                <a:solidFill>
-                  <a:schemeClr val="bg1"/>
-                </a:solidFill>
-                <a:latin typeface="+mj-lt"/>
-              </a:rPr>
-              <a:t>gAiải</a:t>
-            </a:r>
-            <a:r>
-              <a:rPr lang="en-US" sz="4800" dirty="0">
-                <a:solidFill>
-                  <a:schemeClr val="bg1"/>
-                </a:solidFill>
-                <a:latin typeface="Slabo 27px" panose="020B0604020202020204" charset="0"/>
-              </a:rPr>
-              <a:t> quyết vấn đề</a:t>
-            </a:r>
-          </a:p>
-        </p:txBody>
-      </p:sp>
-      <p:sp>
-        <p:nvSpPr>
           <p:cNvPr id="7" name="TextBox 6">
             <a:extLst>
               <a:ext uri="{FF2B5EF4-FFF2-40B4-BE49-F238E27FC236}">
@@ -34524,7 +34192,7 @@
         </p:nvSpPr>
         <p:spPr>
           <a:xfrm>
-            <a:off x="1854156" y="4120348"/>
+            <a:off x="1838008" y="3594340"/>
             <a:ext cx="9077596" cy="523220"/>
           </a:xfrm>
           <a:prstGeom prst="rect">
@@ -34569,7 +34237,7 @@
         </p:nvSpPr>
         <p:spPr>
           <a:xfrm>
-            <a:off x="7040879" y="4901817"/>
+            <a:off x="7040879" y="4600499"/>
             <a:ext cx="8582298" cy="2113079"/>
           </a:xfrm>
           <a:prstGeom prst="rect">
@@ -34776,7 +34444,7 @@
         </p:blipFill>
         <p:spPr bwMode="auto">
           <a:xfrm>
-            <a:off x="1453874" y="5194211"/>
+            <a:off x="1581701" y="4767550"/>
             <a:ext cx="4684037" cy="1545732"/>
           </a:xfrm>
           <a:prstGeom prst="rect">
@@ -35007,16 +34675,8 @@
                 <a:latin typeface="Black Ops One"/>
                 <a:sym typeface="Black Ops One"/>
               </a:rPr>
-              <a:t>1. Giới thiệu</a:t>
+              <a:t>Mục tiêu</a:t>
             </a:r>
-            <a:endParaRPr sz="8000" dirty="0">
-              <a:solidFill>
-                <a:schemeClr val="bg1">
-                  <a:lumMod val="95000"/>
-                </a:schemeClr>
-              </a:solidFill>
-              <a:latin typeface="Black Ops One"/>
-            </a:endParaRPr>
           </a:p>
         </p:txBody>
       </p:sp>
@@ -35488,46 +35148,6 @@
       </p:sp>
       <p:sp>
         <p:nvSpPr>
-          <p:cNvPr id="5" name="TextBox 4">
-            <a:extLst>
-              <a:ext uri="{FF2B5EF4-FFF2-40B4-BE49-F238E27FC236}">
-                <a16:creationId xmlns:a16="http://schemas.microsoft.com/office/drawing/2014/main" id="{C8A032E1-462B-9F50-0169-C7B1E7247B4D}"/>
-              </a:ext>
-            </a:extLst>
-          </p:cNvPr>
-          <p:cNvSpPr txBox="1"/>
-          <p:nvPr/>
-        </p:nvSpPr>
-        <p:spPr>
-          <a:xfrm>
-            <a:off x="1835333" y="3166496"/>
-            <a:ext cx="8605156" cy="769441"/>
-          </a:xfrm>
-          <a:prstGeom prst="rect">
-            <a:avLst/>
-          </a:prstGeom>
-          <a:noFill/>
-        </p:spPr>
-        <p:txBody>
-          <a:bodyPr wrap="square" rtlCol="0">
-            <a:spAutoFit/>
-          </a:bodyPr>
-          <a:lstStyle/>
-          <a:p>
-            <a:r>
-              <a:rPr lang="en-US" sz="4400" dirty="0">
-                <a:solidFill>
-                  <a:schemeClr val="bg1"/>
-                </a:solidFill>
-                <a:latin typeface="+mj-lt"/>
-              </a:rPr>
-              <a:t>Mục tiêu</a:t>
-            </a:r>
-          </a:p>
-        </p:txBody>
-      </p:sp>
-      <p:sp>
-        <p:nvSpPr>
           <p:cNvPr id="7" name="TextBox 6">
             <a:extLst>
               <a:ext uri="{FF2B5EF4-FFF2-40B4-BE49-F238E27FC236}">
@@ -35540,7 +35160,7 @@
         </p:nvSpPr>
         <p:spPr>
           <a:xfrm>
-            <a:off x="1835333" y="4973240"/>
+            <a:off x="1792555" y="4788134"/>
             <a:ext cx="11297964" cy="954107"/>
           </a:xfrm>
           <a:prstGeom prst="rect">
@@ -35706,7 +35326,7 @@
         </p:nvSpPr>
         <p:spPr>
           <a:xfrm>
-            <a:off x="1835333" y="4434899"/>
+            <a:off x="1792555" y="3904802"/>
             <a:ext cx="8605156" cy="584775"/>
           </a:xfrm>
           <a:prstGeom prst="rect">
@@ -35746,7 +35366,7 @@
         </p:nvSpPr>
         <p:spPr>
           <a:xfrm>
-            <a:off x="1792555" y="6966438"/>
+            <a:off x="1792555" y="6878535"/>
             <a:ext cx="11297964" cy="1815882"/>
           </a:xfrm>
           <a:prstGeom prst="rect">
@@ -35847,7 +35467,7 @@
         </p:nvSpPr>
         <p:spPr>
           <a:xfrm>
-            <a:off x="1792555" y="6382198"/>
+            <a:off x="1792555" y="6084637"/>
             <a:ext cx="8605156" cy="584775"/>
           </a:xfrm>
           <a:prstGeom prst="rect">
@@ -36047,8 +35667,8 @@
         </p:nvSpPr>
         <p:spPr>
           <a:xfrm>
-            <a:off x="1838009" y="1563582"/>
-            <a:ext cx="7018020" cy="1477328"/>
+            <a:off x="1838008" y="1563582"/>
+            <a:ext cx="10414951" cy="1477328"/>
           </a:xfrm>
           <a:prstGeom prst="rect">
             <a:avLst/>
@@ -36077,7 +35697,7 @@
               <a:buNone/>
             </a:pPr>
             <a:r>
-              <a:rPr lang="en-US" sz="8000" dirty="0">
+              <a:rPr lang="vi-VN" sz="8000" dirty="0">
                 <a:solidFill>
                   <a:schemeClr val="bg1">
                     <a:lumMod val="95000"/>
@@ -36086,16 +35706,8 @@
                 <a:latin typeface="Black Ops One"/>
                 <a:sym typeface="Black Ops One"/>
               </a:rPr>
-              <a:t>1. Giới thiệu</a:t>
+              <a:t>Hướng giải quyết</a:t>
             </a:r>
-            <a:endParaRPr sz="8000" dirty="0">
-              <a:solidFill>
-                <a:schemeClr val="bg1">
-                  <a:lumMod val="95000"/>
-                </a:schemeClr>
-              </a:solidFill>
-              <a:latin typeface="Black Ops One"/>
-            </a:endParaRPr>
           </a:p>
         </p:txBody>
       </p:sp>
@@ -36565,61 +36177,6 @@
           </a:p>
         </p:txBody>
       </p:sp>
-      <p:sp>
-        <p:nvSpPr>
-          <p:cNvPr id="5" name="TextBox 4">
-            <a:extLst>
-              <a:ext uri="{FF2B5EF4-FFF2-40B4-BE49-F238E27FC236}">
-                <a16:creationId xmlns:a16="http://schemas.microsoft.com/office/drawing/2014/main" id="{C8A032E1-462B-9F50-0169-C7B1E7247B4D}"/>
-              </a:ext>
-            </a:extLst>
-          </p:cNvPr>
-          <p:cNvSpPr txBox="1"/>
-          <p:nvPr/>
-        </p:nvSpPr>
-        <p:spPr>
-          <a:xfrm>
-            <a:off x="1835333" y="3166496"/>
-            <a:ext cx="8605156" cy="769441"/>
-          </a:xfrm>
-          <a:prstGeom prst="rect">
-            <a:avLst/>
-          </a:prstGeom>
-          <a:noFill/>
-        </p:spPr>
-        <p:txBody>
-          <a:bodyPr wrap="square" rtlCol="0">
-            <a:spAutoFit/>
-          </a:bodyPr>
-          <a:lstStyle/>
-          <a:p>
-            <a:r>
-              <a:rPr lang="en-US" sz="4400" dirty="0">
-                <a:solidFill>
-                  <a:schemeClr val="bg1"/>
-                </a:solidFill>
-                <a:latin typeface="+mj-lt"/>
-              </a:rPr>
-              <a:t>Hướng giải </a:t>
-            </a:r>
-            <a:r>
-              <a:rPr lang="en-US" sz="3200" dirty="0">
-                <a:solidFill>
-                  <a:schemeClr val="bg1"/>
-                </a:solidFill>
-                <a:latin typeface="+mj-lt"/>
-              </a:rPr>
-              <a:t>quyết</a:t>
-            </a:r>
-            <a:endParaRPr lang="en-US" sz="4400" dirty="0">
-              <a:solidFill>
-                <a:schemeClr val="bg1"/>
-              </a:solidFill>
-              <a:latin typeface="+mj-lt"/>
-            </a:endParaRPr>
-          </a:p>
-        </p:txBody>
-      </p:sp>
       <p:grpSp>
         <p:nvGrpSpPr>
           <p:cNvPr id="2" name="Group 1">
@@ -36755,7 +36312,7 @@
         </p:nvSpPr>
         <p:spPr>
           <a:xfrm>
-            <a:off x="1792554" y="4312503"/>
+            <a:off x="1685740" y="3892408"/>
             <a:ext cx="10719486" cy="1384995"/>
           </a:xfrm>
           <a:prstGeom prst="rect">
@@ -37210,16 +36767,8 @@
                 <a:latin typeface="Black Ops One"/>
                 <a:sym typeface="Black Ops One"/>
               </a:rPr>
-              <a:t>2. Đặc tả yêu cầu chức năng</a:t>
+              <a:t>Các yêu cầu chức năng</a:t>
             </a:r>
-            <a:endParaRPr sz="8000" dirty="0">
-              <a:solidFill>
-                <a:schemeClr val="bg1">
-                  <a:lumMod val="95000"/>
-                </a:schemeClr>
-              </a:solidFill>
-              <a:latin typeface="Black Ops One"/>
-            </a:endParaRPr>
           </a:p>
         </p:txBody>
       </p:sp>
@@ -37689,46 +37238,6 @@
           </a:p>
         </p:txBody>
       </p:sp>
-      <p:sp>
-        <p:nvSpPr>
-          <p:cNvPr id="5" name="TextBox 4">
-            <a:extLst>
-              <a:ext uri="{FF2B5EF4-FFF2-40B4-BE49-F238E27FC236}">
-                <a16:creationId xmlns:a16="http://schemas.microsoft.com/office/drawing/2014/main" id="{C8A032E1-462B-9F50-0169-C7B1E7247B4D}"/>
-              </a:ext>
-            </a:extLst>
-          </p:cNvPr>
-          <p:cNvSpPr txBox="1"/>
-          <p:nvPr/>
-        </p:nvSpPr>
-        <p:spPr>
-          <a:xfrm>
-            <a:off x="1835333" y="3166496"/>
-            <a:ext cx="8605156" cy="830997"/>
-          </a:xfrm>
-          <a:prstGeom prst="rect">
-            <a:avLst/>
-          </a:prstGeom>
-          <a:noFill/>
-        </p:spPr>
-        <p:txBody>
-          <a:bodyPr wrap="square" rtlCol="0">
-            <a:spAutoFit/>
-          </a:bodyPr>
-          <a:lstStyle/>
-          <a:p>
-            <a:r>
-              <a:rPr lang="en-US" sz="4800" dirty="0">
-                <a:solidFill>
-                  <a:schemeClr val="bg1"/>
-                </a:solidFill>
-                <a:latin typeface="+mj-lt"/>
-              </a:rPr>
-              <a:t>Các yêu cầu chức năng</a:t>
-            </a:r>
-          </a:p>
-        </p:txBody>
-      </p:sp>
       <p:grpSp>
         <p:nvGrpSpPr>
           <p:cNvPr id="2" name="Group 1">
@@ -37864,7 +37373,7 @@
         </p:nvSpPr>
         <p:spPr>
           <a:xfrm>
-            <a:off x="1792554" y="4312503"/>
+            <a:off x="1831726" y="3733383"/>
             <a:ext cx="13493166" cy="1815882"/>
           </a:xfrm>
           <a:prstGeom prst="rect">
@@ -38082,16 +37591,8 @@
                 <a:latin typeface="Black Ops One"/>
                 <a:sym typeface="Black Ops One"/>
               </a:rPr>
-              <a:t>2. Đặc tả yêu cầu chức năng</a:t>
+              <a:t>Các yêu cầu chức năng</a:t>
             </a:r>
-            <a:endParaRPr sz="8000" dirty="0">
-              <a:solidFill>
-                <a:schemeClr val="bg1">
-                  <a:lumMod val="95000"/>
-                </a:schemeClr>
-              </a:solidFill>
-              <a:latin typeface="Black Ops One"/>
-            </a:endParaRPr>
           </a:p>
         </p:txBody>
       </p:sp>
@@ -38757,51 +38258,6 @@
           </a:p>
         </p:txBody>
       </p:sp>
-      <p:sp>
-        <p:nvSpPr>
-          <p:cNvPr id="12" name="TextBox 11">
-            <a:extLst>
-              <a:ext uri="{FF2B5EF4-FFF2-40B4-BE49-F238E27FC236}">
-                <a16:creationId xmlns:a16="http://schemas.microsoft.com/office/drawing/2014/main" id="{A583E048-0092-AA2E-5396-0162CCCC6185}"/>
-              </a:ext>
-            </a:extLst>
-          </p:cNvPr>
-          <p:cNvSpPr txBox="1"/>
-          <p:nvPr/>
-        </p:nvSpPr>
-        <p:spPr>
-          <a:xfrm>
-            <a:off x="1838008" y="6755088"/>
-            <a:ext cx="5279072" cy="646331"/>
-          </a:xfrm>
-          <a:prstGeom prst="rect">
-            <a:avLst/>
-          </a:prstGeom>
-          <a:noFill/>
-        </p:spPr>
-        <p:txBody>
-          <a:bodyPr wrap="square" rtlCol="0">
-            <a:spAutoFit/>
-          </a:bodyPr>
-          <a:lstStyle/>
-          <a:p>
-            <a:pPr>
-              <a:buClr>
-                <a:schemeClr val="bg1"/>
-              </a:buClr>
-            </a:pPr>
-            <a:r>
-              <a:rPr lang="en-US" sz="3600" dirty="0">
-                <a:solidFill>
-                  <a:schemeClr val="bg1"/>
-                </a:solidFill>
-                <a:latin typeface="+mj-lt"/>
-              </a:rPr>
-              <a:t>Các yêu cầu chức năng</a:t>
-            </a:r>
-          </a:p>
-        </p:txBody>
-      </p:sp>
     </p:spTree>
     <p:extLst>
       <p:ext uri="{BB962C8B-B14F-4D97-AF65-F5344CB8AC3E}">

</xml_diff>

<commit_message>
feat: Share thư mục phiên bản mới cho người mua
</commit_message>
<xml_diff>
--- a/docs/gameIndiePPT.pptx
+++ b/docs/gameIndiePPT.pptx
@@ -15136,7 +15136,7 @@
 </file>
 
 <file path=ppt/slides/slide10.xml><?xml version="1.0" encoding="utf-8"?>
-<p:sld xmlns:a="http://schemas.openxmlformats.org/drawingml/2006/main" xmlns:r="http://schemas.openxmlformats.org/officeDocument/2006/relationships" xmlns:p="http://schemas.openxmlformats.org/presentationml/2006/main">
+<p:sld xmlns:a="http://schemas.openxmlformats.org/drawingml/2006/main" xmlns:r="http://schemas.openxmlformats.org/officeDocument/2006/relationships" xmlns:p="http://schemas.openxmlformats.org/presentationml/2006/main" show="0">
   <p:cSld>
     <p:bg>
       <p:bgPr>
@@ -15952,7 +15952,7 @@
 </file>
 
 <file path=ppt/slides/slide11.xml><?xml version="1.0" encoding="utf-8"?>
-<p:sld xmlns:a="http://schemas.openxmlformats.org/drawingml/2006/main" xmlns:r="http://schemas.openxmlformats.org/officeDocument/2006/relationships" xmlns:p="http://schemas.openxmlformats.org/presentationml/2006/main">
+<p:sld xmlns:a="http://schemas.openxmlformats.org/drawingml/2006/main" xmlns:r="http://schemas.openxmlformats.org/officeDocument/2006/relationships" xmlns:p="http://schemas.openxmlformats.org/presentationml/2006/main" show="0">
   <p:cSld>
     <p:bg>
       <p:bgPr>
@@ -17494,107 +17494,6 @@
           </p:txBody>
         </p:sp>
       </p:grpSp>
-      <p:sp>
-        <p:nvSpPr>
-          <p:cNvPr id="7" name="TextBox 6">
-            <a:extLst>
-              <a:ext uri="{FF2B5EF4-FFF2-40B4-BE49-F238E27FC236}">
-                <a16:creationId xmlns:a16="http://schemas.microsoft.com/office/drawing/2014/main" id="{1062AFC2-5AFA-BAB3-C861-19A60564C993}"/>
-              </a:ext>
-            </a:extLst>
-          </p:cNvPr>
-          <p:cNvSpPr txBox="1"/>
-          <p:nvPr/>
-        </p:nvSpPr>
-        <p:spPr>
-          <a:xfrm>
-            <a:off x="1681780" y="3694017"/>
-            <a:ext cx="10525460" cy="2677656"/>
-          </a:xfrm>
-          <a:prstGeom prst="rect">
-            <a:avLst/>
-          </a:prstGeom>
-          <a:noFill/>
-        </p:spPr>
-        <p:txBody>
-          <a:bodyPr wrap="square" rtlCol="0">
-            <a:spAutoFit/>
-          </a:bodyPr>
-          <a:lstStyle/>
-          <a:p>
-            <a:pPr marL="457200" indent="-457200">
-              <a:buClr>
-                <a:schemeClr val="bg1"/>
-              </a:buClr>
-              <a:buFont typeface="Wingdings" panose="05000000000000000000" pitchFamily="2" charset="2"/>
-              <a:buChar char="v"/>
-            </a:pPr>
-            <a:r>
-              <a:rPr lang="en-US" sz="2800" dirty="0">
-                <a:solidFill>
-                  <a:schemeClr val="bg1"/>
-                </a:solidFill>
-                <a:latin typeface="+mj-lt"/>
-              </a:rPr>
-              <a:t>Yêu cầu thực thi: độ ổn định, sẵn sàng và chính xác.</a:t>
-            </a:r>
-          </a:p>
-          <a:p>
-            <a:pPr marL="457200" indent="-457200">
-              <a:buClr>
-                <a:schemeClr val="bg1"/>
-              </a:buClr>
-              <a:buFont typeface="Wingdings" panose="05000000000000000000" pitchFamily="2" charset="2"/>
-              <a:buChar char="v"/>
-            </a:pPr>
-            <a:r>
-              <a:rPr lang="en-US" sz="2800" dirty="0">
-                <a:solidFill>
-                  <a:schemeClr val="bg1"/>
-                </a:solidFill>
-                <a:latin typeface="+mj-lt"/>
-              </a:rPr>
-              <a:t>Yêu cầu về an toàn: lưu trữ an toàn, có phương án sao lưu dữ liệu.</a:t>
-            </a:r>
-          </a:p>
-          <a:p>
-            <a:pPr marL="457200" indent="-457200">
-              <a:buClr>
-                <a:schemeClr val="bg1"/>
-              </a:buClr>
-              <a:buFont typeface="Wingdings" panose="05000000000000000000" pitchFamily="2" charset="2"/>
-              <a:buChar char="v"/>
-            </a:pPr>
-            <a:r>
-              <a:rPr lang="en-US" sz="2800" dirty="0">
-                <a:solidFill>
-                  <a:schemeClr val="bg1"/>
-                </a:solidFill>
-                <a:latin typeface="+mj-lt"/>
-              </a:rPr>
-              <a:t>Yêu cầu về bảo mật: mã hoá thông tin tài khoản, phân quyền các chức năng.</a:t>
-            </a:r>
-          </a:p>
-          <a:p>
-            <a:pPr marL="457200" indent="-457200">
-              <a:buClr>
-                <a:schemeClr val="bg1"/>
-              </a:buClr>
-              <a:buFont typeface="Wingdings" panose="05000000000000000000" pitchFamily="2" charset="2"/>
-              <a:buChar char="v"/>
-            </a:pPr>
-            <a:r>
-              <a:rPr lang="en-US" sz="2800" dirty="0">
-                <a:solidFill>
-                  <a:schemeClr val="bg1"/>
-                </a:solidFill>
-                <a:latin typeface="+mj-lt"/>
-              </a:rPr>
-              <a:t>Yêu cầu về giao diện: đầy đủ thông tin, đẹp mắt.</a:t>
-            </a:r>
-          </a:p>
-        </p:txBody>
-      </p:sp>
     </p:spTree>
     <p:extLst>
       <p:ext uri="{BB962C8B-B14F-4D97-AF65-F5344CB8AC3E}">
@@ -18358,8 +18257,8 @@
         </p:blipFill>
         <p:spPr>
           <a:xfrm>
-            <a:off x="4042024" y="3038102"/>
-            <a:ext cx="10756015" cy="5960058"/>
+            <a:off x="3585647" y="2974320"/>
+            <a:ext cx="11030336" cy="6112063"/>
           </a:xfrm>
           <a:prstGeom prst="rect">
             <a:avLst/>
@@ -18380,7 +18279,7 @@
         </p:nvSpPr>
         <p:spPr>
           <a:xfrm>
-            <a:off x="6429350" y="9222337"/>
+            <a:off x="6143152" y="9183888"/>
             <a:ext cx="5915326" cy="461665"/>
           </a:xfrm>
           <a:prstGeom prst="rect">
@@ -18425,7 +18324,7 @@
 </file>
 
 <file path=ppt/slides/slide14.xml><?xml version="1.0" encoding="utf-8"?>
-<p:sld xmlns:a="http://schemas.openxmlformats.org/drawingml/2006/main" xmlns:r="http://schemas.openxmlformats.org/officeDocument/2006/relationships" xmlns:p="http://schemas.openxmlformats.org/presentationml/2006/main">
+<p:sld xmlns:a="http://schemas.openxmlformats.org/drawingml/2006/main" xmlns:r="http://schemas.openxmlformats.org/officeDocument/2006/relationships" xmlns:p="http://schemas.openxmlformats.org/presentationml/2006/main" show="0">
   <p:cSld>
     <p:bg>
       <p:bgPr>
@@ -27092,7 +26991,7 @@
                 </a:solidFill>
                 <a:latin typeface="+mj-lt"/>
               </a:rPr>
-              <a:t>Có tổng cộng 39 trường hợp kiểm thử.</a:t>
+              <a:t>Có tổng cộng 40 trường hợp kiểm thử.</a:t>
             </a:r>
           </a:p>
           <a:p>
@@ -27113,7 +27012,7 @@
                 </a:solidFill>
                 <a:latin typeface="+mj-lt"/>
               </a:rPr>
-              <a:t>Số trường hợp kiểm thử thành công: 39/39.</a:t>
+              <a:t>Số trường hợp kiểm thử thành công: 40/40.</a:t>
             </a:r>
           </a:p>
           <a:p>
@@ -27134,7 +27033,7 @@
                 </a:solidFill>
                 <a:latin typeface="+mj-lt"/>
               </a:rPr>
-              <a:t>Số trường hợp kiểm thử thất bại: 0/39.</a:t>
+              <a:t>Số trường hợp kiểm thử thất bại: 0/40.</a:t>
             </a:r>
           </a:p>
           <a:p>
@@ -28897,7 +28796,7 @@
         <p:spPr>
           <a:xfrm>
             <a:off x="1784399" y="5853626"/>
-            <a:ext cx="14472046" cy="1597938"/>
+            <a:ext cx="14472046" cy="2113079"/>
           </a:xfrm>
           <a:prstGeom prst="rect">
             <a:avLst/>
@@ -28928,7 +28827,7 @@
                 <a:latin typeface="+mj-lt"/>
                 <a:cs typeface="Times New Roman" panose="02020603050405020304" pitchFamily="18" charset="0"/>
               </a:rPr>
-              <a:t>Giao diện còn đơn giản, một số tính năng chưa được hoàn thành do hạn chế thời gian thực hiện đề tài.</a:t>
+              <a:t>Giao diện còn đơn giản, chưa tương thích với Table và Mobile do hạn chế thời gian thực hiện đề tài.</a:t>
             </a:r>
           </a:p>
           <a:p>
@@ -28960,14 +28859,24 @@
                 <a:latin typeface="+mj-lt"/>
                 <a:cs typeface="Times New Roman" panose="02020603050405020304" pitchFamily="18" charset="0"/>
               </a:rPr>
-              <a:t> lưu trữ </a:t>
+              <a:t> </a:t>
+            </a:r>
+            <a:r>
+              <a:rPr lang="vi-VN" sz="2800" dirty="0">
+                <a:solidFill>
+                  <a:schemeClr val="bg1"/>
+                </a:solidFill>
+                <a:latin typeface="+mn-lt"/>
+                <a:cs typeface="Times New Roman" panose="02020603050405020304" pitchFamily="18" charset="0"/>
+              </a:rPr>
+              <a:t>lưu trữ </a:t>
             </a:r>
             <a:r>
               <a:rPr lang="en-US" sz="2800" dirty="0">
                 <a:solidFill>
                   <a:schemeClr val="bg1"/>
                 </a:solidFill>
-                <a:latin typeface="+mj-lt"/>
+                <a:latin typeface="+mn-lt"/>
                 <a:cs typeface="Times New Roman" panose="02020603050405020304" pitchFamily="18" charset="0"/>
               </a:rPr>
               <a:t>nhiều </a:t>
@@ -28977,7 +28886,7 @@
                 <a:solidFill>
                   <a:schemeClr val="bg1"/>
                 </a:solidFill>
-                <a:latin typeface="+mj-lt"/>
+                <a:latin typeface="+mn-lt"/>
                 <a:cs typeface="Times New Roman" panose="02020603050405020304" pitchFamily="18" charset="0"/>
               </a:rPr>
               <a:t>hình ảnh và tập tin từ máy chủ lên Google Drive chưa được nhanh.</a:t>
@@ -29586,7 +29495,7 @@
         <p:spPr>
           <a:xfrm>
             <a:off x="1784399" y="5853626"/>
-            <a:ext cx="14472046" cy="2643544"/>
+            <a:ext cx="14472046" cy="2113079"/>
           </a:xfrm>
           <a:prstGeom prst="rect">
             <a:avLst/>
@@ -29635,27 +29544,6 @@
                 <a:latin typeface="+mn-lt"/>
               </a:rPr>
               <a:t> cách lưu trữ tệp khác để tăng tốc độ tải lên hình ảnh và tập tin</a:t>
-            </a:r>
-          </a:p>
-          <a:p>
-            <a:pPr marL="457200" indent="-457200">
-              <a:lnSpc>
-                <a:spcPct val="120000"/>
-              </a:lnSpc>
-              <a:buClr>
-                <a:schemeClr val="bg1"/>
-              </a:buClr>
-              <a:buFont typeface="Wingdings" panose="05000000000000000000" pitchFamily="2" charset="2"/>
-              <a:buChar char="v"/>
-            </a:pPr>
-            <a:r>
-              <a:rPr lang="vi-VN" sz="2800" dirty="0">
-                <a:solidFill>
-                  <a:schemeClr val="bg1"/>
-                </a:solidFill>
-                <a:latin typeface="+mn-lt"/>
-              </a:rPr>
-              <a:t>Áp dụng được mô hình MVC trong lập trình website.</a:t>
             </a:r>
           </a:p>
           <a:p>
@@ -30053,7 +29941,7 @@
                   <a:srgbClr val="FFFFFF"/>
                 </a:solidFill>
               </a:rPr>
-              <a:t>Cảm ơn thầy cô và các bạn đã dạng thời gian lắng nghe</a:t>
+              <a:t>Cảm ơn thầy cô và các bạn đã dành thời gian lắng nghe</a:t>
             </a:r>
             <a:endParaRPr b="1" dirty="0"/>
           </a:p>
@@ -32109,7 +31997,7 @@
         </p:blipFill>
         <p:spPr bwMode="auto">
           <a:xfrm>
-            <a:off x="11482007" y="2826753"/>
+            <a:off x="11576745" y="3045877"/>
             <a:ext cx="4954845" cy="2839383"/>
           </a:xfrm>
           <a:prstGeom prst="rect">
@@ -32156,7 +32044,7 @@
         </p:blipFill>
         <p:spPr bwMode="auto">
           <a:xfrm>
-            <a:off x="11482006" y="6202215"/>
+            <a:off x="11586038" y="6710188"/>
             <a:ext cx="4954845" cy="2315851"/>
           </a:xfrm>
           <a:prstGeom prst="rect">
@@ -32359,51 +32247,6 @@
           </p:txBody>
         </p:sp>
       </p:grpSp>
-      <p:pic>
-        <p:nvPicPr>
-          <p:cNvPr id="1032" name="Picture 8" descr="Wholesome Direct - Indie Game Showcase 5.26.2020 - YouTube">
-            <a:extLst>
-              <a:ext uri="{FF2B5EF4-FFF2-40B4-BE49-F238E27FC236}">
-                <a16:creationId xmlns:a16="http://schemas.microsoft.com/office/drawing/2014/main" id="{58460871-D642-BD0B-2CF4-C5E95C84A742}"/>
-              </a:ext>
-            </a:extLst>
-          </p:cNvPr>
-          <p:cNvPicPr>
-            <a:picLocks noChangeAspect="1" noChangeArrowheads="1"/>
-          </p:cNvPicPr>
-          <p:nvPr/>
-        </p:nvPicPr>
-        <p:blipFill rotWithShape="1">
-          <a:blip r:embed="rId8">
-            <a:extLst>
-              <a:ext uri="{28A0092B-C50C-407E-A947-70E740481C1C}">
-                <a14:useLocalDpi xmlns:a14="http://schemas.microsoft.com/office/drawing/2010/main" val="0"/>
-              </a:ext>
-            </a:extLst>
-          </a:blip>
-          <a:srcRect t="13855" b="13232"/>
-          <a:stretch/>
-        </p:blipFill>
-        <p:spPr bwMode="auto">
-          <a:xfrm>
-            <a:off x="2588826" y="7566365"/>
-            <a:ext cx="4411145" cy="2315851"/>
-          </a:xfrm>
-          <a:prstGeom prst="rect">
-            <a:avLst/>
-          </a:prstGeom>
-          <a:noFill/>
-          <a:extLst>
-            <a:ext uri="{909E8E84-426E-40DD-AFC4-6F175D3DCCD1}">
-              <a14:hiddenFill xmlns:a14="http://schemas.microsoft.com/office/drawing/2010/main">
-                <a:solidFill>
-                  <a:srgbClr val="FFFFFF"/>
-                </a:solidFill>
-              </a14:hiddenFill>
-            </a:ext>
-          </a:extLst>
-        </p:spPr>
-      </p:pic>
     </p:spTree>
   </p:cSld>
   <p:clrMapOvr>
@@ -36632,7 +36475,7 @@
 </file>
 
 <file path=ppt/slides/slide8.xml><?xml version="1.0" encoding="utf-8"?>
-<p:sld xmlns:a="http://schemas.openxmlformats.org/drawingml/2006/main" xmlns:r="http://schemas.openxmlformats.org/officeDocument/2006/relationships" xmlns:p="http://schemas.openxmlformats.org/presentationml/2006/main">
+<p:sld xmlns:a="http://schemas.openxmlformats.org/drawingml/2006/main" xmlns:r="http://schemas.openxmlformats.org/officeDocument/2006/relationships" xmlns:p="http://schemas.openxmlformats.org/presentationml/2006/main" show="0">
   <p:cSld>
     <p:bg>
       <p:bgPr>
@@ -37401,7 +37244,7 @@
                 </a:solidFill>
                 <a:latin typeface="+mj-lt"/>
               </a:rPr>
-              <a:t>Website phục vụ 2 nhóm người sử dụng: người dùng và quản trị viên</a:t>
+              <a:t>Phục vụ 2 nhóm người sử dụng: người dùng và quản trị viên</a:t>
             </a:r>
           </a:p>
           <a:p>
@@ -38177,7 +38020,7 @@
               <a:pPr algn="ctr"/>
               <a:r>
                 <a:rPr lang="en-US" sz="2400" dirty="0"/>
-                <a:t>9</a:t>
+                <a:t>8</a:t>
               </a:r>
             </a:p>
           </p:txBody>
@@ -38254,6 +38097,89 @@
                 <a:latin typeface="+mj-lt"/>
               </a:rPr>
               <a:t>Sơ đồ use case tổng quát</a:t>
+            </a:r>
+          </a:p>
+        </p:txBody>
+      </p:sp>
+      <p:sp>
+        <p:nvSpPr>
+          <p:cNvPr id="5" name="TextBox 4">
+            <a:extLst>
+              <a:ext uri="{FF2B5EF4-FFF2-40B4-BE49-F238E27FC236}">
+                <a16:creationId xmlns:a16="http://schemas.microsoft.com/office/drawing/2014/main" id="{6CE1CAFA-831F-1BD0-F683-41E61CF48FB7}"/>
+              </a:ext>
+            </a:extLst>
+          </p:cNvPr>
+          <p:cNvSpPr txBox="1"/>
+          <p:nvPr/>
+        </p:nvSpPr>
+        <p:spPr>
+          <a:xfrm>
+            <a:off x="1753865" y="5839360"/>
+            <a:ext cx="5254874" cy="3539430"/>
+          </a:xfrm>
+          <a:prstGeom prst="rect">
+            <a:avLst/>
+          </a:prstGeom>
+          <a:noFill/>
+        </p:spPr>
+        <p:txBody>
+          <a:bodyPr wrap="square" rtlCol="0">
+            <a:spAutoFit/>
+          </a:bodyPr>
+          <a:lstStyle/>
+          <a:p>
+            <a:pPr marL="457200" indent="-457200">
+              <a:buClr>
+                <a:schemeClr val="bg1"/>
+              </a:buClr>
+              <a:buFont typeface="Wingdings" panose="05000000000000000000" pitchFamily="2" charset="2"/>
+              <a:buChar char="v"/>
+            </a:pPr>
+            <a:r>
+              <a:rPr lang="en-US" sz="2800" dirty="0">
+                <a:solidFill>
+                  <a:schemeClr val="bg1"/>
+                </a:solidFill>
+                <a:latin typeface="+mj-lt"/>
+              </a:rPr>
+              <a:t>Phục vụ 2 nhóm người sử dụng: người dùng và quản trị viên</a:t>
+            </a:r>
+          </a:p>
+          <a:p>
+            <a:pPr marL="457200" indent="-457200">
+              <a:buClr>
+                <a:schemeClr val="bg1"/>
+              </a:buClr>
+              <a:buFont typeface="Wingdings" panose="05000000000000000000" pitchFamily="2" charset="2"/>
+              <a:buChar char="v"/>
+            </a:pPr>
+            <a:r>
+              <a:rPr lang="en-US" sz="2800" dirty="0">
+                <a:solidFill>
+                  <a:schemeClr val="bg1"/>
+                </a:solidFill>
+                <a:latin typeface="+mj-lt"/>
+              </a:rPr>
+              <a:t>Cung cấp các chức năng của một sàn giao dịch trực tuyến</a:t>
+            </a:r>
+          </a:p>
+          <a:p>
+            <a:pPr marL="457200" indent="-457200">
+              <a:buClr>
+                <a:schemeClr val="bg1"/>
+              </a:buClr>
+              <a:buFont typeface="Wingdings" panose="05000000000000000000" pitchFamily="2" charset="2"/>
+              <a:buChar char="v"/>
+            </a:pPr>
+            <a:r>
+              <a:rPr lang="en-US" sz="2800" dirty="0">
+                <a:solidFill>
+                  <a:schemeClr val="bg1"/>
+                </a:solidFill>
+                <a:latin typeface="+mj-lt"/>
+              </a:rPr>
+              <a:t>Tích hợp diễn đàn cho phép đăng bài viết và thảo luận.</a:t>
             </a:r>
           </a:p>
         </p:txBody>

</xml_diff>